<commit_message>
Adding context slides to the documentation and removing one duplicate file
</commit_message>
<xml_diff>
--- a/documentation/Architecture Overview of the EPARtexttools Package.pptx
+++ b/documentation/Architecture Overview of the EPARtexttools Package.pptx
@@ -7,13 +7,14 @@
     <p:sldMasterId id="2147483652" r:id="rId3"/>
   </p:sldMasterIdLst>
   <p:notesMasterIdLst>
-    <p:notesMasterId r:id="rId8"/>
+    <p:notesMasterId r:id="rId9"/>
   </p:notesMasterIdLst>
   <p:sldIdLst>
     <p:sldId id="259" r:id="rId4"/>
-    <p:sldId id="270" r:id="rId5"/>
-    <p:sldId id="271" r:id="rId6"/>
-    <p:sldId id="269" r:id="rId7"/>
+    <p:sldId id="273" r:id="rId5"/>
+    <p:sldId id="270" r:id="rId6"/>
+    <p:sldId id="271" r:id="rId7"/>
+    <p:sldId id="269" r:id="rId8"/>
   </p:sldIdLst>
   <p:sldSz cx="9144000" cy="6858000" type="screen4x3"/>
   <p:notesSz cx="6858000" cy="9144000"/>
@@ -213,7 +214,7 @@
           <a:p>
             <a:fld id="{9E37E260-6440-4804-B65E-C0FDFD91F4D0}" type="datetimeFigureOut">
               <a:rPr lang="en-US" smtClean="0"/>
-              <a:t>8/14/2017</a:t>
+              <a:t>8/28/2017</a:t>
             </a:fld>
             <a:endParaRPr lang="en-US"/>
           </a:p>
@@ -613,7 +614,7 @@
           <a:p>
             <a:fld id="{E0A55718-353C-43EE-BEC1-920DBE6DAFBA}" type="slidenum">
               <a:rPr lang="en-US" smtClean="0"/>
-              <a:t>2</a:t>
+              <a:t>3</a:t>
             </a:fld>
             <a:endParaRPr lang="en-US"/>
           </a:p>
@@ -764,7 +765,7 @@
           <a:p>
             <a:fld id="{E0A55718-353C-43EE-BEC1-920DBE6DAFBA}" type="slidenum">
               <a:rPr lang="en-US" smtClean="0"/>
-              <a:t>3</a:t>
+              <a:t>4</a:t>
             </a:fld>
             <a:endParaRPr lang="en-US"/>
           </a:p>
@@ -915,7 +916,7 @@
           <a:p>
             <a:fld id="{E0A55718-353C-43EE-BEC1-920DBE6DAFBA}" type="slidenum">
               <a:rPr lang="en-US" smtClean="0"/>
-              <a:t>4</a:t>
+              <a:t>5</a:t>
             </a:fld>
             <a:endParaRPr lang="en-US"/>
           </a:p>
@@ -5302,15 +5303,7 @@
           <a:p>
             <a:r>
               <a:rPr lang="en-US" sz="1800" dirty="0" smtClean="0"/>
-              <a:t>August</a:t>
-            </a:r>
-            <a:r>
-              <a:rPr lang="en-US" sz="1800" dirty="0" smtClean="0"/>
-              <a:t> </a:t>
-            </a:r>
-            <a:r>
-              <a:rPr lang="en-US" sz="1800" dirty="0" smtClean="0"/>
-              <a:t>2017, D. Graham Andrews</a:t>
+              <a:t>August 2017, D. Graham Andrews</a:t>
             </a:r>
             <a:endParaRPr lang="en-US" sz="1800" dirty="0">
               <a:solidFill>
@@ -5541,1271 +5534,68 @@
           <a:lstStyle/>
           <a:p>
             <a:r>
-              <a:rPr lang="en-US" dirty="0" smtClean="0">
-                <a:solidFill>
-                  <a:schemeClr val="accent3"/>
-                </a:solidFill>
-                <a:latin typeface="Trebuchet MS" panose="020B0603020202020204" pitchFamily="34" charset="0"/>
-              </a:rPr>
-              <a:t>Important files and functions</a:t>
-            </a:r>
-            <a:endParaRPr lang="en-US" dirty="0">
-              <a:solidFill>
-                <a:schemeClr val="accent3"/>
-              </a:solidFill>
-              <a:latin typeface="Trebuchet MS" panose="020B0603020202020204" pitchFamily="34" charset="0"/>
-            </a:endParaRPr>
+              <a:rPr lang="en-US" dirty="0" smtClean="0"/>
+              <a:t>Audience and Purpose</a:t>
+            </a:r>
+            <a:endParaRPr lang="en-US" dirty="0"/>
           </a:p>
         </p:txBody>
       </p:sp>
       <p:sp>
         <p:nvSpPr>
-          <p:cNvPr id="5" name="Text Placeholder 2"/>
-          <p:cNvSpPr txBox="1">
-            <a:spLocks/>
+          <p:cNvPr id="3" name="Text Placeholder 2"/>
+          <p:cNvSpPr>
+            <a:spLocks noGrp="1"/>
           </p:cNvSpPr>
-          <p:nvPr/>
+          <p:nvPr>
+            <p:ph type="body" sz="quarter" idx="11"/>
+          </p:nvPr>
         </p:nvSpPr>
-        <p:spPr>
-          <a:xfrm>
-            <a:off x="671757" y="4527868"/>
-            <a:ext cx="8197114" cy="3810086"/>
-          </a:xfrm>
-          <a:prstGeom prst="rect">
-            <a:avLst/>
-          </a:prstGeom>
-        </p:spPr>
+        <p:spPr/>
         <p:txBody>
           <a:bodyPr/>
-          <a:lstStyle>
-            <a:lvl1pPr marL="342900" indent="-342900" algn="l" defTabSz="457200" rtl="0" eaLnBrk="1" latinLnBrk="0" hangingPunct="1">
-              <a:spcBef>
-                <a:spcPct val="20000"/>
-              </a:spcBef>
-              <a:buFont typeface="Lucida Grande"/>
-              <a:buChar char="&gt;"/>
-              <a:defRPr sz="2400" b="1" i="0" kern="1200" baseline="0">
-                <a:solidFill>
-                  <a:schemeClr val="tx1"/>
-                </a:solidFill>
-                <a:latin typeface="Open Sans"/>
-                <a:ea typeface="+mn-ea"/>
-                <a:cs typeface="Open Sans"/>
-              </a:defRPr>
-            </a:lvl1pPr>
-            <a:lvl2pPr marL="742950" indent="-285750" algn="l" defTabSz="457200" rtl="0" eaLnBrk="1" latinLnBrk="0" hangingPunct="1">
-              <a:spcBef>
-                <a:spcPct val="20000"/>
-              </a:spcBef>
-              <a:buFont typeface="Arial"/>
-              <a:buChar char="–"/>
-              <a:defRPr sz="2000" b="1" i="0" kern="1200" baseline="0">
-                <a:solidFill>
-                  <a:schemeClr val="tx1"/>
-                </a:solidFill>
-                <a:latin typeface="Open Sans"/>
-                <a:ea typeface="+mn-ea"/>
-                <a:cs typeface="Open Sans"/>
-              </a:defRPr>
-            </a:lvl2pPr>
-            <a:lvl3pPr marL="1143000" indent="-228600" algn="l" defTabSz="457200" rtl="0" eaLnBrk="1" latinLnBrk="0" hangingPunct="1">
-              <a:spcBef>
-                <a:spcPct val="20000"/>
-              </a:spcBef>
-              <a:buSzPct val="100000"/>
-              <a:buFont typeface="Lucida Grande"/>
-              <a:buChar char="&gt;"/>
-              <a:defRPr sz="1800" b="1" i="0" kern="1200" baseline="0">
-                <a:solidFill>
-                  <a:schemeClr val="tx1"/>
-                </a:solidFill>
-                <a:latin typeface="Open Sans"/>
-                <a:ea typeface="+mn-ea"/>
-                <a:cs typeface="Open Sans"/>
-              </a:defRPr>
-            </a:lvl3pPr>
-            <a:lvl4pPr marL="1600200" indent="-228600" algn="l" defTabSz="457200" rtl="0" eaLnBrk="1" latinLnBrk="0" hangingPunct="1">
-              <a:spcBef>
-                <a:spcPct val="20000"/>
-              </a:spcBef>
-              <a:buFont typeface="Arial"/>
-              <a:buChar char="–"/>
-              <a:defRPr sz="1600" b="1" i="0" kern="1200" baseline="0">
-                <a:solidFill>
-                  <a:schemeClr val="tx1"/>
-                </a:solidFill>
-                <a:latin typeface="Open Sans"/>
-                <a:ea typeface="+mn-ea"/>
-                <a:cs typeface="Open Sans"/>
-              </a:defRPr>
-            </a:lvl4pPr>
-            <a:lvl5pPr marL="2057400" indent="-228600" algn="l" defTabSz="457200" rtl="0" eaLnBrk="1" latinLnBrk="0" hangingPunct="1">
-              <a:spcBef>
-                <a:spcPct val="20000"/>
-              </a:spcBef>
-              <a:buFont typeface="Lucida Grande"/>
-              <a:buChar char="&gt;"/>
-              <a:defRPr sz="1400" b="1" i="0" kern="1200" baseline="0">
-                <a:solidFill>
-                  <a:schemeClr val="tx1"/>
-                </a:solidFill>
-                <a:latin typeface="Open Sans"/>
-                <a:ea typeface="+mn-ea"/>
-                <a:cs typeface="Open Sans"/>
-              </a:defRPr>
-            </a:lvl5pPr>
-            <a:lvl6pPr marL="2514600" indent="-228600" algn="l" defTabSz="457200" rtl="0" eaLnBrk="1" latinLnBrk="0" hangingPunct="1">
-              <a:spcBef>
-                <a:spcPct val="20000"/>
-              </a:spcBef>
-              <a:buFont typeface="Arial"/>
-              <a:buChar char="•"/>
-              <a:defRPr sz="2000" kern="1200">
-                <a:solidFill>
-                  <a:schemeClr val="tx1"/>
-                </a:solidFill>
-                <a:latin typeface="+mn-lt"/>
-                <a:ea typeface="+mn-ea"/>
-                <a:cs typeface="+mn-cs"/>
-              </a:defRPr>
-            </a:lvl6pPr>
-            <a:lvl7pPr marL="2971800" indent="-228600" algn="l" defTabSz="457200" rtl="0" eaLnBrk="1" latinLnBrk="0" hangingPunct="1">
-              <a:spcBef>
-                <a:spcPct val="20000"/>
-              </a:spcBef>
-              <a:buFont typeface="Arial"/>
-              <a:buChar char="•"/>
-              <a:defRPr sz="2000" kern="1200">
-                <a:solidFill>
-                  <a:schemeClr val="tx1"/>
-                </a:solidFill>
-                <a:latin typeface="+mn-lt"/>
-                <a:ea typeface="+mn-ea"/>
-                <a:cs typeface="+mn-cs"/>
-              </a:defRPr>
-            </a:lvl7pPr>
-            <a:lvl8pPr marL="3429000" indent="-228600" algn="l" defTabSz="457200" rtl="0" eaLnBrk="1" latinLnBrk="0" hangingPunct="1">
-              <a:spcBef>
-                <a:spcPct val="20000"/>
-              </a:spcBef>
-              <a:buFont typeface="Arial"/>
-              <a:buChar char="•"/>
-              <a:defRPr sz="2000" kern="1200">
-                <a:solidFill>
-                  <a:schemeClr val="tx1"/>
-                </a:solidFill>
-                <a:latin typeface="+mn-lt"/>
-                <a:ea typeface="+mn-ea"/>
-                <a:cs typeface="+mn-cs"/>
-              </a:defRPr>
-            </a:lvl8pPr>
-            <a:lvl9pPr marL="3886200" indent="-228600" algn="l" defTabSz="457200" rtl="0" eaLnBrk="1" latinLnBrk="0" hangingPunct="1">
-              <a:spcBef>
-                <a:spcPct val="20000"/>
-              </a:spcBef>
-              <a:buFont typeface="Arial"/>
-              <a:buChar char="•"/>
-              <a:defRPr sz="2000" kern="1200">
-                <a:solidFill>
-                  <a:schemeClr val="tx1"/>
-                </a:solidFill>
-                <a:latin typeface="+mn-lt"/>
-                <a:ea typeface="+mn-ea"/>
-                <a:cs typeface="+mn-cs"/>
-              </a:defRPr>
-            </a:lvl9pPr>
-          </a:lstStyle>
-          <a:p>
-            <a:endParaRPr lang="en-US" dirty="0" smtClean="0">
-              <a:latin typeface="Trebuchet MS" panose="020B0603020202020204" pitchFamily="34" charset="0"/>
-            </a:endParaRPr>
+          <a:lstStyle/>
+          <a:p>
+            <a:r>
+              <a:rPr lang="en-US" dirty="0" smtClean="0"/>
+              <a:t>This slide deck is aimed at people who want to understand what this toolset does without knowing exactly how to use it. </a:t>
+            </a:r>
+          </a:p>
+          <a:p>
+            <a:pPr marL="0" indent="0">
+              <a:buNone/>
+            </a:pPr>
+            <a:endParaRPr lang="en-US" dirty="0"/>
           </a:p>
         </p:txBody>
       </p:sp>
       <p:sp>
         <p:nvSpPr>
-          <p:cNvPr id="6" name="Text Placeholder 3"/>
-          <p:cNvSpPr txBox="1">
-            <a:spLocks/>
+          <p:cNvPr id="4" name="Text Placeholder 3"/>
+          <p:cNvSpPr>
+            <a:spLocks noGrp="1"/>
           </p:cNvSpPr>
-          <p:nvPr/>
+          <p:nvPr>
+            <p:ph type="body" sz="quarter" idx="12"/>
+          </p:nvPr>
         </p:nvSpPr>
-        <p:spPr>
-          <a:xfrm>
-            <a:off x="664271" y="4765220"/>
-            <a:ext cx="8184662" cy="411171"/>
-          </a:xfrm>
-          <a:prstGeom prst="rect">
-            <a:avLst/>
-          </a:prstGeom>
-        </p:spPr>
+        <p:spPr/>
         <p:txBody>
-          <a:bodyPr>
-            <a:noAutofit/>
-          </a:bodyPr>
-          <a:lstStyle>
-            <a:lvl1pPr marL="0" indent="0" algn="l" defTabSz="457200" rtl="0" eaLnBrk="1" latinLnBrk="0" hangingPunct="1">
-              <a:lnSpc>
-                <a:spcPct val="90000"/>
-              </a:lnSpc>
-              <a:spcBef>
-                <a:spcPct val="20000"/>
-              </a:spcBef>
-              <a:buFont typeface="Arial"/>
-              <a:buNone/>
-              <a:defRPr sz="2400" b="0" i="0" kern="1200" baseline="0">
-                <a:solidFill>
-                  <a:schemeClr val="tx1"/>
-                </a:solidFill>
-                <a:latin typeface="Uni Sans Regular"/>
-                <a:ea typeface="+mn-ea"/>
-                <a:cs typeface="Uni Sans Regular"/>
-              </a:defRPr>
-            </a:lvl1pPr>
-            <a:lvl2pPr marL="457200" indent="0" algn="l" defTabSz="457200" rtl="0" eaLnBrk="1" latinLnBrk="0" hangingPunct="1">
-              <a:spcBef>
-                <a:spcPct val="20000"/>
-              </a:spcBef>
-              <a:buFont typeface="Arial"/>
-              <a:buNone/>
-              <a:defRPr sz="2800" b="0" i="0" kern="1200">
-                <a:solidFill>
-                  <a:srgbClr val="E8D3A2"/>
-                </a:solidFill>
-                <a:latin typeface="Encode Sans Normal Black"/>
-                <a:ea typeface="+mn-ea"/>
-                <a:cs typeface="Encode Sans Normal Black"/>
-              </a:defRPr>
-            </a:lvl2pPr>
-            <a:lvl3pPr marL="914400" indent="0" algn="l" defTabSz="457200" rtl="0" eaLnBrk="1" latinLnBrk="0" hangingPunct="1">
-              <a:spcBef>
-                <a:spcPct val="20000"/>
-              </a:spcBef>
-              <a:buFont typeface="Arial"/>
-              <a:buNone/>
-              <a:defRPr sz="2400" b="0" i="0" kern="1200">
-                <a:solidFill>
-                  <a:srgbClr val="E8D3A2"/>
-                </a:solidFill>
-                <a:latin typeface="Encode Sans Normal Black"/>
-                <a:ea typeface="+mn-ea"/>
-                <a:cs typeface="Encode Sans Normal Black"/>
-              </a:defRPr>
-            </a:lvl3pPr>
-            <a:lvl4pPr marL="1371600" indent="0" algn="l" defTabSz="457200" rtl="0" eaLnBrk="1" latinLnBrk="0" hangingPunct="1">
-              <a:spcBef>
-                <a:spcPct val="20000"/>
-              </a:spcBef>
-              <a:buFont typeface="Arial"/>
-              <a:buNone/>
-              <a:defRPr sz="2000" b="0" i="0" kern="1200">
-                <a:solidFill>
-                  <a:srgbClr val="E8D3A2"/>
-                </a:solidFill>
-                <a:latin typeface="Encode Sans Normal Black"/>
-                <a:ea typeface="+mn-ea"/>
-                <a:cs typeface="Encode Sans Normal Black"/>
-              </a:defRPr>
-            </a:lvl4pPr>
-            <a:lvl5pPr marL="1828800" indent="0" algn="l" defTabSz="457200" rtl="0" eaLnBrk="1" latinLnBrk="0" hangingPunct="1">
-              <a:spcBef>
-                <a:spcPct val="20000"/>
-              </a:spcBef>
-              <a:buFont typeface="Arial"/>
-              <a:buNone/>
-              <a:defRPr sz="2000" b="0" i="0" kern="1200">
-                <a:solidFill>
-                  <a:srgbClr val="E8D3A2"/>
-                </a:solidFill>
-                <a:latin typeface="Encode Sans Normal Black"/>
-                <a:ea typeface="+mn-ea"/>
-                <a:cs typeface="Encode Sans Normal Black"/>
-              </a:defRPr>
-            </a:lvl5pPr>
-            <a:lvl6pPr marL="2514600" indent="-228600" algn="l" defTabSz="457200" rtl="0" eaLnBrk="1" latinLnBrk="0" hangingPunct="1">
-              <a:spcBef>
-                <a:spcPct val="20000"/>
-              </a:spcBef>
-              <a:buFont typeface="Arial"/>
-              <a:buChar char="•"/>
-              <a:defRPr sz="2000" kern="1200">
-                <a:solidFill>
-                  <a:schemeClr val="tx1"/>
-                </a:solidFill>
-                <a:latin typeface="+mn-lt"/>
-                <a:ea typeface="+mn-ea"/>
-                <a:cs typeface="+mn-cs"/>
-              </a:defRPr>
-            </a:lvl6pPr>
-            <a:lvl7pPr marL="2971800" indent="-228600" algn="l" defTabSz="457200" rtl="0" eaLnBrk="1" latinLnBrk="0" hangingPunct="1">
-              <a:spcBef>
-                <a:spcPct val="20000"/>
-              </a:spcBef>
-              <a:buFont typeface="Arial"/>
-              <a:buChar char="•"/>
-              <a:defRPr sz="2000" kern="1200">
-                <a:solidFill>
-                  <a:schemeClr val="tx1"/>
-                </a:solidFill>
-                <a:latin typeface="+mn-lt"/>
-                <a:ea typeface="+mn-ea"/>
-                <a:cs typeface="+mn-cs"/>
-              </a:defRPr>
-            </a:lvl7pPr>
-            <a:lvl8pPr marL="3429000" indent="-228600" algn="l" defTabSz="457200" rtl="0" eaLnBrk="1" latinLnBrk="0" hangingPunct="1">
-              <a:spcBef>
-                <a:spcPct val="20000"/>
-              </a:spcBef>
-              <a:buFont typeface="Arial"/>
-              <a:buChar char="•"/>
-              <a:defRPr sz="2000" kern="1200">
-                <a:solidFill>
-                  <a:schemeClr val="tx1"/>
-                </a:solidFill>
-                <a:latin typeface="+mn-lt"/>
-                <a:ea typeface="+mn-ea"/>
-                <a:cs typeface="+mn-cs"/>
-              </a:defRPr>
-            </a:lvl8pPr>
-            <a:lvl9pPr marL="3886200" indent="-228600" algn="l" defTabSz="457200" rtl="0" eaLnBrk="1" latinLnBrk="0" hangingPunct="1">
-              <a:spcBef>
-                <a:spcPct val="20000"/>
-              </a:spcBef>
-              <a:buFont typeface="Arial"/>
-              <a:buChar char="•"/>
-              <a:defRPr sz="2000" kern="1200">
-                <a:solidFill>
-                  <a:schemeClr val="tx1"/>
-                </a:solidFill>
-                <a:latin typeface="+mn-lt"/>
-                <a:ea typeface="+mn-ea"/>
-                <a:cs typeface="+mn-cs"/>
-              </a:defRPr>
-            </a:lvl9pPr>
-          </a:lstStyle>
-          <a:p>
-            <a:endParaRPr lang="en-US" dirty="0">
-              <a:latin typeface="Trebuchet MS" panose="020B0603020202020204" pitchFamily="34" charset="0"/>
-            </a:endParaRPr>
-          </a:p>
-        </p:txBody>
-      </p:sp>
-      <p:sp>
-        <p:nvSpPr>
-          <p:cNvPr id="3" name="Rounded Rectangle 2"/>
-          <p:cNvSpPr/>
-          <p:nvPr/>
-        </p:nvSpPr>
-        <p:spPr>
-          <a:xfrm>
-            <a:off x="644332" y="1805931"/>
-            <a:ext cx="8028887" cy="1036857"/>
-          </a:xfrm>
-          <a:prstGeom prst="roundRect">
-            <a:avLst/>
-          </a:prstGeom>
-        </p:spPr>
-        <p:style>
-          <a:lnRef idx="1">
-            <a:schemeClr val="accent2"/>
-          </a:lnRef>
-          <a:fillRef idx="3">
-            <a:schemeClr val="accent2"/>
-          </a:fillRef>
-          <a:effectRef idx="2">
-            <a:schemeClr val="accent2"/>
-          </a:effectRef>
-          <a:fontRef idx="minor">
-            <a:schemeClr val="lt1"/>
-          </a:fontRef>
-        </p:style>
-        <p:txBody>
-          <a:bodyPr rtlCol="0" anchor="t"/>
+          <a:bodyPr/>
           <a:lstStyle/>
           <a:p>
             <a:r>
-              <a:rPr lang="en-US" sz="1200" b="1" dirty="0" err="1" smtClean="0">
-                <a:solidFill>
-                  <a:schemeClr val="bg1"/>
-                </a:solidFill>
-              </a:rPr>
-              <a:t>textFunctions.r</a:t>
-            </a:r>
-            <a:r>
-              <a:rPr lang="en-US" sz="1200" dirty="0" smtClean="0">
-                <a:solidFill>
-                  <a:schemeClr val="bg1"/>
-                </a:solidFill>
-              </a:rPr>
-              <a:t>: This file contains all important text processing functions for creating a corpus and term-document matrix. All </a:t>
-            </a:r>
-            <a:r>
-              <a:rPr lang="en-US" sz="1200" dirty="0" err="1" smtClean="0">
-                <a:solidFill>
-                  <a:schemeClr val="bg1"/>
-                </a:solidFill>
-              </a:rPr>
-              <a:t>wordcounting</a:t>
-            </a:r>
-            <a:r>
-              <a:rPr lang="en-US" sz="1200" dirty="0" smtClean="0">
-                <a:solidFill>
-                  <a:schemeClr val="bg1"/>
-                </a:solidFill>
-              </a:rPr>
-              <a:t> functions are here. These functions are also used by all other files to prepare documents for processing</a:t>
-            </a:r>
-          </a:p>
-          <a:p>
-            <a:r>
-              <a:rPr lang="en-US" sz="1200" dirty="0" err="1" smtClean="0">
-                <a:solidFill>
-                  <a:schemeClr val="bg1"/>
-                </a:solidFill>
-              </a:rPr>
-              <a:t>Selecred</a:t>
-            </a:r>
-            <a:r>
-              <a:rPr lang="en-US" sz="1200" dirty="0" smtClean="0">
-                <a:solidFill>
-                  <a:schemeClr val="bg1"/>
-                </a:solidFill>
-              </a:rPr>
-              <a:t> Functions: </a:t>
-            </a:r>
-            <a:r>
-              <a:rPr lang="en-US" sz="1200" dirty="0" err="1" smtClean="0">
-                <a:solidFill>
-                  <a:schemeClr val="bg1"/>
-                </a:solidFill>
-              </a:rPr>
-              <a:t>example_documents</a:t>
-            </a:r>
-            <a:r>
-              <a:rPr lang="en-US" sz="1200" dirty="0" smtClean="0">
-                <a:solidFill>
-                  <a:schemeClr val="bg1"/>
-                </a:solidFill>
-              </a:rPr>
-              <a:t>(), </a:t>
-            </a:r>
-            <a:r>
-              <a:rPr lang="en-US" sz="1200" dirty="0" err="1" smtClean="0">
-                <a:solidFill>
-                  <a:schemeClr val="bg1"/>
-                </a:solidFill>
-              </a:rPr>
-              <a:t>getTextR</a:t>
-            </a:r>
-            <a:r>
-              <a:rPr lang="en-US" sz="1200" dirty="0" smtClean="0">
-                <a:solidFill>
-                  <a:schemeClr val="bg1"/>
-                </a:solidFill>
-              </a:rPr>
-              <a:t>(), </a:t>
-            </a:r>
-            <a:r>
-              <a:rPr lang="en-US" sz="1200" dirty="0" err="1" smtClean="0">
-                <a:solidFill>
-                  <a:schemeClr val="bg1"/>
-                </a:solidFill>
-              </a:rPr>
-              <a:t>readMails</a:t>
-            </a:r>
-            <a:r>
-              <a:rPr lang="en-US" sz="1200" dirty="0" smtClean="0">
-                <a:solidFill>
-                  <a:schemeClr val="bg1"/>
-                </a:solidFill>
-              </a:rPr>
-              <a:t>(), </a:t>
-            </a:r>
-            <a:r>
-              <a:rPr lang="en-US" sz="1200" dirty="0" err="1" smtClean="0">
-                <a:solidFill>
-                  <a:schemeClr val="bg1"/>
-                </a:solidFill>
-              </a:rPr>
-              <a:t>makeworking</a:t>
-            </a:r>
-            <a:r>
-              <a:rPr lang="en-US" sz="1200" dirty="0" smtClean="0">
-                <a:solidFill>
-                  <a:schemeClr val="bg1"/>
-                </a:solidFill>
-              </a:rPr>
-              <a:t>(), </a:t>
-            </a:r>
-            <a:r>
-              <a:rPr lang="en-US" sz="1200" dirty="0" err="1" smtClean="0">
-                <a:solidFill>
-                  <a:schemeClr val="bg1"/>
-                </a:solidFill>
-              </a:rPr>
-              <a:t>read_docxtm</a:t>
-            </a:r>
-            <a:r>
-              <a:rPr lang="en-US" sz="1200" dirty="0" smtClean="0">
-                <a:solidFill>
-                  <a:schemeClr val="bg1"/>
-                </a:solidFill>
-              </a:rPr>
-              <a:t>(), readPDF2(), </a:t>
-            </a:r>
-            <a:r>
-              <a:rPr lang="en-US" sz="1200" dirty="0" err="1" smtClean="0">
-                <a:solidFill>
-                  <a:schemeClr val="bg1"/>
-                </a:solidFill>
-              </a:rPr>
-              <a:t>allDocs</a:t>
-            </a:r>
-            <a:r>
-              <a:rPr lang="en-US" sz="1200" dirty="0" smtClean="0">
-                <a:solidFill>
-                  <a:schemeClr val="bg1"/>
-                </a:solidFill>
-              </a:rPr>
-              <a:t>(), </a:t>
-            </a:r>
-            <a:r>
-              <a:rPr lang="en-US" sz="1200" dirty="0" err="1" smtClean="0">
-                <a:solidFill>
-                  <a:schemeClr val="bg1"/>
-                </a:solidFill>
-              </a:rPr>
-              <a:t>doc_clean_process</a:t>
-            </a:r>
-            <a:r>
-              <a:rPr lang="en-US" sz="1200" dirty="0" smtClean="0">
-                <a:solidFill>
-                  <a:schemeClr val="bg1"/>
-                </a:solidFill>
-              </a:rPr>
-              <a:t>(), </a:t>
-            </a:r>
-            <a:r>
-              <a:rPr lang="en-US" sz="1200" dirty="0" err="1" smtClean="0">
-                <a:solidFill>
-                  <a:schemeClr val="bg1"/>
-                </a:solidFill>
-              </a:rPr>
-              <a:t>assocPTable</a:t>
-            </a:r>
-            <a:r>
-              <a:rPr lang="en-US" sz="1200" dirty="0" smtClean="0">
-                <a:solidFill>
-                  <a:schemeClr val="bg1"/>
-                </a:solidFill>
-              </a:rPr>
-              <a:t>(), </a:t>
-            </a:r>
-            <a:r>
-              <a:rPr lang="en-US" sz="1200" dirty="0" err="1" smtClean="0">
-                <a:solidFill>
-                  <a:schemeClr val="bg1"/>
-                </a:solidFill>
-              </a:rPr>
-              <a:t>assocPrettyOneStep</a:t>
-            </a:r>
-            <a:r>
-              <a:rPr lang="en-US" sz="1200" dirty="0" smtClean="0">
-                <a:solidFill>
-                  <a:schemeClr val="bg1"/>
-                </a:solidFill>
-              </a:rPr>
-              <a:t>(), OCR_DOCS()</a:t>
-            </a:r>
-          </a:p>
-        </p:txBody>
-      </p:sp>
-      <p:sp>
-        <p:nvSpPr>
-          <p:cNvPr id="9" name="Rounded Rectangle 8"/>
-          <p:cNvSpPr/>
-          <p:nvPr/>
-        </p:nvSpPr>
-        <p:spPr>
-          <a:xfrm>
-            <a:off x="644332" y="3285211"/>
-            <a:ext cx="2524381" cy="2816825"/>
-          </a:xfrm>
-          <a:prstGeom prst="roundRect">
-            <a:avLst/>
-          </a:prstGeom>
-        </p:spPr>
-        <p:style>
-          <a:lnRef idx="1">
-            <a:schemeClr val="accent2"/>
-          </a:lnRef>
-          <a:fillRef idx="3">
-            <a:schemeClr val="accent2"/>
-          </a:fillRef>
-          <a:effectRef idx="2">
-            <a:schemeClr val="accent2"/>
-          </a:effectRef>
-          <a:fontRef idx="minor">
-            <a:schemeClr val="lt1"/>
-          </a:fontRef>
-        </p:style>
-        <p:txBody>
-          <a:bodyPr rtlCol="0" anchor="t"/>
-          <a:lstStyle/>
-          <a:p>
-            <a:r>
-              <a:rPr lang="en-US" sz="1200" b="1" dirty="0" err="1">
-                <a:solidFill>
-                  <a:schemeClr val="bg1"/>
-                </a:solidFill>
-              </a:rPr>
-              <a:t>s</a:t>
-            </a:r>
-            <a:r>
-              <a:rPr lang="en-US" sz="1200" b="1" dirty="0" err="1" smtClean="0">
-                <a:solidFill>
-                  <a:schemeClr val="bg1"/>
-                </a:solidFill>
-              </a:rPr>
-              <a:t>pacy_functions.r</a:t>
-            </a:r>
-            <a:r>
-              <a:rPr lang="en-US" sz="1200" dirty="0" smtClean="0">
-                <a:solidFill>
-                  <a:schemeClr val="bg1"/>
-                </a:solidFill>
-              </a:rPr>
-              <a:t>: contains the grammar parsing portion of the topic model code. </a:t>
-            </a:r>
-            <a:r>
-              <a:rPr lang="en-US" sz="1200" dirty="0">
-                <a:solidFill>
-                  <a:schemeClr val="bg1"/>
-                </a:solidFill>
-              </a:rPr>
-              <a:t>U</a:t>
-            </a:r>
-            <a:r>
-              <a:rPr lang="en-US" sz="1200" dirty="0" smtClean="0">
-                <a:solidFill>
-                  <a:schemeClr val="bg1"/>
-                </a:solidFill>
-              </a:rPr>
-              <a:t>ses functions from </a:t>
-            </a:r>
-            <a:r>
-              <a:rPr lang="en-US" sz="1200" dirty="0" err="1" smtClean="0">
-                <a:solidFill>
-                  <a:schemeClr val="bg1"/>
-                </a:solidFill>
-              </a:rPr>
-              <a:t>textFunctions.r</a:t>
-            </a:r>
-            <a:r>
-              <a:rPr lang="en-US" sz="1200" dirty="0" smtClean="0">
-                <a:solidFill>
-                  <a:schemeClr val="bg1"/>
-                </a:solidFill>
-              </a:rPr>
-              <a:t> and then its own functions to invoke the “Spacy” package for grammar processing. Important functions:</a:t>
-            </a:r>
-          </a:p>
-          <a:p>
-            <a:pPr marL="285750" indent="-285750">
-              <a:buFont typeface="Arial" panose="020B0604020202020204" pitchFamily="34" charset="0"/>
-              <a:buChar char="•"/>
-            </a:pPr>
-            <a:r>
-              <a:rPr lang="en-US" sz="1200" dirty="0" err="1" smtClean="0">
-                <a:solidFill>
-                  <a:schemeClr val="bg1"/>
-                </a:solidFill>
-              </a:rPr>
-              <a:t>SPCY_PreTopicFrame</a:t>
-            </a:r>
-            <a:r>
-              <a:rPr lang="en-US" sz="1200" dirty="0" smtClean="0">
-                <a:solidFill>
-                  <a:schemeClr val="bg1"/>
-                </a:solidFill>
-              </a:rPr>
-              <a:t>()</a:t>
-            </a:r>
-          </a:p>
-          <a:p>
-            <a:pPr marL="285750" indent="-285750">
-              <a:buFont typeface="Arial" panose="020B0604020202020204" pitchFamily="34" charset="0"/>
-              <a:buChar char="•"/>
-            </a:pPr>
-            <a:r>
-              <a:rPr lang="en-US" sz="1200" dirty="0" err="1">
-                <a:solidFill>
-                  <a:schemeClr val="bg1"/>
-                </a:solidFill>
-              </a:rPr>
-              <a:t>m</a:t>
-            </a:r>
-            <a:r>
-              <a:rPr lang="en-US" sz="1200" dirty="0" err="1" smtClean="0">
-                <a:solidFill>
-                  <a:schemeClr val="bg1"/>
-                </a:solidFill>
-              </a:rPr>
-              <a:t>aketermkeywords</a:t>
-            </a:r>
-            <a:r>
-              <a:rPr lang="en-US" sz="1200" dirty="0" smtClean="0">
-                <a:solidFill>
-                  <a:schemeClr val="bg1"/>
-                </a:solidFill>
-              </a:rPr>
-              <a:t>()</a:t>
-            </a:r>
-          </a:p>
-          <a:p>
-            <a:pPr marL="285750" indent="-285750">
-              <a:buFont typeface="Arial" panose="020B0604020202020204" pitchFamily="34" charset="0"/>
-              <a:buChar char="•"/>
-            </a:pPr>
-            <a:r>
-              <a:rPr lang="en-US" sz="1200" dirty="0" err="1">
-                <a:solidFill>
-                  <a:schemeClr val="bg1"/>
-                </a:solidFill>
-              </a:rPr>
-              <a:t>s</a:t>
-            </a:r>
-            <a:r>
-              <a:rPr lang="en-US" sz="1200" dirty="0" err="1" smtClean="0">
-                <a:solidFill>
-                  <a:schemeClr val="bg1"/>
-                </a:solidFill>
-              </a:rPr>
-              <a:t>entkeeper</a:t>
-            </a:r>
-            <a:r>
-              <a:rPr lang="en-US" sz="1200" dirty="0" smtClean="0">
-                <a:solidFill>
-                  <a:schemeClr val="bg1"/>
-                </a:solidFill>
-              </a:rPr>
-              <a:t>()</a:t>
-            </a:r>
-          </a:p>
-          <a:p>
-            <a:pPr marL="285750" indent="-285750">
-              <a:buFont typeface="Arial" panose="020B0604020202020204" pitchFamily="34" charset="0"/>
-              <a:buChar char="•"/>
-            </a:pPr>
-            <a:r>
-              <a:rPr lang="en-US" sz="1200" dirty="0" err="1" smtClean="0">
-                <a:solidFill>
-                  <a:schemeClr val="bg1"/>
-                </a:solidFill>
-              </a:rPr>
-              <a:t>conligraph</a:t>
-            </a:r>
-            <a:r>
-              <a:rPr lang="en-US" sz="1200" dirty="0" smtClean="0">
-                <a:solidFill>
-                  <a:schemeClr val="bg1"/>
-                </a:solidFill>
-              </a:rPr>
-              <a:t>()</a:t>
-            </a:r>
-          </a:p>
-        </p:txBody>
-      </p:sp>
-      <p:sp>
-        <p:nvSpPr>
-          <p:cNvPr id="10" name="Rounded Rectangle 9"/>
-          <p:cNvSpPr/>
-          <p:nvPr/>
-        </p:nvSpPr>
-        <p:spPr>
-          <a:xfrm>
-            <a:off x="3395314" y="3285208"/>
-            <a:ext cx="2498493" cy="2816828"/>
-          </a:xfrm>
-          <a:prstGeom prst="roundRect">
-            <a:avLst/>
-          </a:prstGeom>
-        </p:spPr>
-        <p:style>
-          <a:lnRef idx="1">
-            <a:schemeClr val="accent2"/>
-          </a:lnRef>
-          <a:fillRef idx="3">
-            <a:schemeClr val="accent2"/>
-          </a:fillRef>
-          <a:effectRef idx="2">
-            <a:schemeClr val="accent2"/>
-          </a:effectRef>
-          <a:fontRef idx="minor">
-            <a:schemeClr val="lt1"/>
-          </a:fontRef>
-        </p:style>
-        <p:txBody>
-          <a:bodyPr rtlCol="0" anchor="t"/>
-          <a:lstStyle/>
-          <a:p>
-            <a:r>
-              <a:rPr lang="en-US" sz="1200" b="1" dirty="0" err="1" smtClean="0">
-                <a:solidFill>
-                  <a:schemeClr val="bg1"/>
-                </a:solidFill>
-              </a:rPr>
-              <a:t>topicFunctions.r</a:t>
-            </a:r>
-            <a:r>
-              <a:rPr lang="en-US" sz="1200" dirty="0" smtClean="0">
-                <a:solidFill>
-                  <a:schemeClr val="bg1"/>
-                </a:solidFill>
-              </a:rPr>
-              <a:t>: contains more grammar parsing but uses the </a:t>
-            </a:r>
-            <a:r>
-              <a:rPr lang="en-US" sz="1200" dirty="0" err="1" smtClean="0">
-                <a:solidFill>
-                  <a:schemeClr val="bg1"/>
-                </a:solidFill>
-              </a:rPr>
-              <a:t>openNLP</a:t>
-            </a:r>
-            <a:r>
-              <a:rPr lang="en-US" sz="1200" dirty="0" smtClean="0">
-                <a:solidFill>
-                  <a:schemeClr val="bg1"/>
-                </a:solidFill>
-              </a:rPr>
-              <a:t> and IBM </a:t>
-            </a:r>
-            <a:r>
-              <a:rPr lang="en-US" sz="1200" dirty="0" err="1" smtClean="0">
-                <a:solidFill>
-                  <a:schemeClr val="bg1"/>
-                </a:solidFill>
-              </a:rPr>
-              <a:t>watson</a:t>
-            </a:r>
-            <a:r>
-              <a:rPr lang="en-US" sz="1200" dirty="0" smtClean="0">
-                <a:solidFill>
-                  <a:schemeClr val="bg1"/>
-                </a:solidFill>
-              </a:rPr>
-              <a:t> packages instead of the Spacy package for grammar parsing and sentiment analysis Important functions:</a:t>
-            </a:r>
-          </a:p>
-          <a:p>
-            <a:pPr marL="285750" indent="-285750">
-              <a:buFont typeface="Arial" panose="020B0604020202020204" pitchFamily="34" charset="0"/>
-              <a:buChar char="•"/>
-            </a:pPr>
-            <a:r>
-              <a:rPr lang="en-US" sz="1200" dirty="0" smtClean="0">
-                <a:solidFill>
-                  <a:schemeClr val="bg1"/>
-                </a:solidFill>
-              </a:rPr>
-              <a:t>PreTopicFrame2()</a:t>
-            </a:r>
-          </a:p>
-          <a:p>
-            <a:pPr marL="285750" indent="-285750">
-              <a:buFont typeface="Arial" panose="020B0604020202020204" pitchFamily="34" charset="0"/>
-              <a:buChar char="•"/>
-            </a:pPr>
-            <a:r>
-              <a:rPr lang="en-US" sz="1200" dirty="0" err="1">
-                <a:solidFill>
-                  <a:schemeClr val="bg1"/>
-                </a:solidFill>
-              </a:rPr>
-              <a:t>AnnotateVerbsTopicJoin</a:t>
-            </a:r>
-            <a:r>
-              <a:rPr lang="en-US" sz="1200" dirty="0">
-                <a:solidFill>
-                  <a:schemeClr val="bg1"/>
-                </a:solidFill>
-              </a:rPr>
-              <a:t>()</a:t>
-            </a:r>
-            <a:endParaRPr lang="en-US" sz="1200" dirty="0" smtClean="0">
-              <a:solidFill>
-                <a:schemeClr val="bg1"/>
-              </a:solidFill>
-            </a:endParaRPr>
-          </a:p>
-          <a:p>
-            <a:pPr marL="285750" indent="-285750">
-              <a:buFont typeface="Arial" panose="020B0604020202020204" pitchFamily="34" charset="0"/>
-              <a:buChar char="•"/>
-            </a:pPr>
-            <a:r>
-              <a:rPr lang="en-US" sz="1200" dirty="0" err="1">
-                <a:solidFill>
-                  <a:schemeClr val="bg1"/>
-                </a:solidFill>
-              </a:rPr>
-              <a:t>idtopics</a:t>
-            </a:r>
-            <a:r>
-              <a:rPr lang="en-US" sz="1200" dirty="0">
-                <a:solidFill>
-                  <a:schemeClr val="bg1"/>
-                </a:solidFill>
-              </a:rPr>
-              <a:t>()</a:t>
-            </a:r>
-            <a:endParaRPr lang="en-US" sz="1200" dirty="0" smtClean="0">
-              <a:solidFill>
-                <a:schemeClr val="bg1"/>
-              </a:solidFill>
-            </a:endParaRPr>
-          </a:p>
-          <a:p>
-            <a:pPr marL="285750" indent="-285750">
-              <a:buFont typeface="Arial" panose="020B0604020202020204" pitchFamily="34" charset="0"/>
-              <a:buChar char="•"/>
-            </a:pPr>
-            <a:r>
-              <a:rPr lang="en-US" sz="1200" dirty="0" err="1">
-                <a:solidFill>
-                  <a:schemeClr val="bg1"/>
-                </a:solidFill>
-              </a:rPr>
-              <a:t>data_mapper</a:t>
-            </a:r>
-            <a:r>
-              <a:rPr lang="en-US" sz="1200" dirty="0">
-                <a:solidFill>
-                  <a:schemeClr val="bg1"/>
-                </a:solidFill>
-              </a:rPr>
-              <a:t>()</a:t>
-            </a:r>
-            <a:endParaRPr lang="en-US" sz="1200" dirty="0" smtClean="0">
-              <a:solidFill>
-                <a:schemeClr val="bg1"/>
-              </a:solidFill>
-            </a:endParaRPr>
-          </a:p>
-        </p:txBody>
-      </p:sp>
-      <p:sp>
-        <p:nvSpPr>
-          <p:cNvPr id="11" name="Rounded Rectangle 10"/>
-          <p:cNvSpPr/>
-          <p:nvPr/>
-        </p:nvSpPr>
-        <p:spPr>
-          <a:xfrm>
-            <a:off x="6083929" y="3285209"/>
-            <a:ext cx="2589290" cy="2816827"/>
-          </a:xfrm>
-          <a:prstGeom prst="roundRect">
-            <a:avLst/>
-          </a:prstGeom>
-        </p:spPr>
-        <p:style>
-          <a:lnRef idx="1">
-            <a:schemeClr val="accent2"/>
-          </a:lnRef>
-          <a:fillRef idx="3">
-            <a:schemeClr val="accent2"/>
-          </a:fillRef>
-          <a:effectRef idx="2">
-            <a:schemeClr val="accent2"/>
-          </a:effectRef>
-          <a:fontRef idx="minor">
-            <a:schemeClr val="lt1"/>
-          </a:fontRef>
-        </p:style>
-        <p:txBody>
-          <a:bodyPr rtlCol="0" anchor="t"/>
-          <a:lstStyle/>
-          <a:p>
-            <a:r>
-              <a:rPr lang="en-US" sz="1200" b="1" dirty="0" err="1" smtClean="0">
-                <a:solidFill>
-                  <a:schemeClr val="bg1"/>
-                </a:solidFill>
-              </a:rPr>
-              <a:t>formFunctions.r</a:t>
-            </a:r>
-            <a:r>
-              <a:rPr lang="en-US" sz="1200" dirty="0" smtClean="0">
-                <a:solidFill>
-                  <a:schemeClr val="bg1"/>
-                </a:solidFill>
-              </a:rPr>
-              <a:t>: contains functions for extracting data specifically from Gates Foundation proposals like Outcomes tables and   from structured </a:t>
-            </a:r>
-            <a:r>
-              <a:rPr lang="en-US" sz="1200" dirty="0" err="1" smtClean="0">
-                <a:solidFill>
-                  <a:schemeClr val="bg1"/>
-                </a:solidFill>
-              </a:rPr>
-              <a:t>docx</a:t>
-            </a:r>
-            <a:r>
-              <a:rPr lang="en-US" sz="1200" dirty="0" smtClean="0">
-                <a:solidFill>
-                  <a:schemeClr val="bg1"/>
-                </a:solidFill>
-              </a:rPr>
-              <a:t> files as provided by the Gates foundation. Important functions:</a:t>
-            </a:r>
-          </a:p>
-          <a:p>
-            <a:pPr marL="285750" indent="-285750">
-              <a:buFont typeface="Arial" panose="020B0604020202020204" pitchFamily="34" charset="0"/>
-              <a:buChar char="•"/>
-            </a:pPr>
-            <a:r>
-              <a:rPr lang="en-US" sz="1200" dirty="0" err="1">
-                <a:solidFill>
-                  <a:schemeClr val="bg1"/>
-                </a:solidFill>
-              </a:rPr>
-              <a:t>docx_table_view</a:t>
-            </a:r>
-            <a:r>
-              <a:rPr lang="en-US" sz="1200" dirty="0">
-                <a:solidFill>
-                  <a:schemeClr val="bg1"/>
-                </a:solidFill>
-              </a:rPr>
-              <a:t>()</a:t>
-            </a:r>
-            <a:endParaRPr lang="en-US" sz="1200" dirty="0" smtClean="0">
-              <a:solidFill>
-                <a:schemeClr val="bg1"/>
-              </a:solidFill>
-            </a:endParaRPr>
-          </a:p>
-          <a:p>
-            <a:pPr marL="285750" indent="-285750">
-              <a:buFont typeface="Arial" panose="020B0604020202020204" pitchFamily="34" charset="0"/>
-              <a:buChar char="•"/>
-            </a:pPr>
-            <a:r>
-              <a:rPr lang="en-US" sz="1200" dirty="0" err="1">
-                <a:solidFill>
-                  <a:schemeClr val="bg1"/>
-                </a:solidFill>
-              </a:rPr>
-              <a:t>outcome_extractor</a:t>
-            </a:r>
-            <a:r>
-              <a:rPr lang="en-US" sz="1200" dirty="0">
-                <a:solidFill>
-                  <a:schemeClr val="bg1"/>
-                </a:solidFill>
-              </a:rPr>
-              <a:t>()</a:t>
-            </a:r>
-            <a:endParaRPr lang="en-US" sz="1200" dirty="0" smtClean="0">
-              <a:solidFill>
-                <a:schemeClr val="bg1"/>
-              </a:solidFill>
-            </a:endParaRPr>
-          </a:p>
-          <a:p>
-            <a:pPr marL="285750" indent="-285750">
-              <a:buFont typeface="Arial" panose="020B0604020202020204" pitchFamily="34" charset="0"/>
-              <a:buChar char="•"/>
-            </a:pPr>
-            <a:r>
-              <a:rPr lang="en-US" sz="1200" dirty="0" err="1">
-                <a:solidFill>
-                  <a:schemeClr val="bg1"/>
-                </a:solidFill>
-              </a:rPr>
-              <a:t>cell_extractor</a:t>
-            </a:r>
-            <a:r>
-              <a:rPr lang="en-US" sz="1200" dirty="0">
-                <a:solidFill>
-                  <a:schemeClr val="bg1"/>
-                </a:solidFill>
-              </a:rPr>
-              <a:t>()</a:t>
-            </a:r>
-            <a:endParaRPr lang="en-US" sz="1200" dirty="0" smtClean="0">
-              <a:solidFill>
-                <a:schemeClr val="bg1"/>
-              </a:solidFill>
-            </a:endParaRPr>
-          </a:p>
-          <a:p>
-            <a:pPr marL="285750" indent="-285750">
-              <a:buFont typeface="Arial" panose="020B0604020202020204" pitchFamily="34" charset="0"/>
-              <a:buChar char="•"/>
-            </a:pPr>
-            <a:r>
-              <a:rPr lang="en-US" sz="1200" dirty="0" err="1">
-                <a:solidFill>
-                  <a:schemeClr val="bg1"/>
-                </a:solidFill>
-              </a:rPr>
-              <a:t>docx_man_ex</a:t>
-            </a:r>
-            <a:r>
-              <a:rPr lang="en-US" sz="1200" dirty="0" smtClean="0">
-                <a:solidFill>
-                  <a:schemeClr val="bg1"/>
-                </a:solidFill>
-              </a:rPr>
-              <a:t>()</a:t>
-            </a:r>
-          </a:p>
-          <a:p>
-            <a:pPr marL="285750" indent="-285750">
-              <a:buFont typeface="Arial" panose="020B0604020202020204" pitchFamily="34" charset="0"/>
-              <a:buChar char="•"/>
-            </a:pPr>
-            <a:r>
-              <a:rPr lang="en-US" sz="1200" dirty="0" err="1" smtClean="0">
-                <a:solidFill>
-                  <a:schemeClr val="bg1"/>
-                </a:solidFill>
-              </a:rPr>
-              <a:t>Formcluster</a:t>
-            </a:r>
-            <a:r>
-              <a:rPr lang="en-US" sz="1200" dirty="0" smtClean="0">
-                <a:solidFill>
-                  <a:schemeClr val="bg1"/>
-                </a:solidFill>
-              </a:rPr>
-              <a:t>()</a:t>
-            </a:r>
-          </a:p>
-        </p:txBody>
-      </p:sp>
-      <p:sp>
-        <p:nvSpPr>
-          <p:cNvPr id="4" name="Down Arrow 3"/>
-          <p:cNvSpPr/>
-          <p:nvPr/>
-        </p:nvSpPr>
-        <p:spPr>
-          <a:xfrm>
-            <a:off x="1747319" y="2942376"/>
-            <a:ext cx="316871" cy="271604"/>
-          </a:xfrm>
-          <a:prstGeom prst="downArrow">
-            <a:avLst/>
-          </a:prstGeom>
-        </p:spPr>
-        <p:style>
-          <a:lnRef idx="1">
-            <a:schemeClr val="accent4"/>
-          </a:lnRef>
-          <a:fillRef idx="3">
-            <a:schemeClr val="accent4"/>
-          </a:fillRef>
-          <a:effectRef idx="2">
-            <a:schemeClr val="accent4"/>
-          </a:effectRef>
-          <a:fontRef idx="minor">
-            <a:schemeClr val="lt1"/>
-          </a:fontRef>
-        </p:style>
-        <p:txBody>
-          <a:bodyPr rtlCol="0" anchor="ctr"/>
-          <a:lstStyle/>
-          <a:p>
-            <a:pPr algn="ctr"/>
-            <a:endParaRPr lang="en-US"/>
-          </a:p>
-        </p:txBody>
-      </p:sp>
-      <p:sp>
-        <p:nvSpPr>
-          <p:cNvPr id="12" name="Down Arrow 11"/>
-          <p:cNvSpPr/>
-          <p:nvPr/>
-        </p:nvSpPr>
-        <p:spPr>
-          <a:xfrm>
-            <a:off x="4486124" y="2928196"/>
-            <a:ext cx="316871" cy="271604"/>
-          </a:xfrm>
-          <a:prstGeom prst="downArrow">
-            <a:avLst/>
-          </a:prstGeom>
-        </p:spPr>
-        <p:style>
-          <a:lnRef idx="1">
-            <a:schemeClr val="accent4"/>
-          </a:lnRef>
-          <a:fillRef idx="3">
-            <a:schemeClr val="accent4"/>
-          </a:fillRef>
-          <a:effectRef idx="2">
-            <a:schemeClr val="accent4"/>
-          </a:effectRef>
-          <a:fontRef idx="minor">
-            <a:schemeClr val="lt1"/>
-          </a:fontRef>
-        </p:style>
-        <p:txBody>
-          <a:bodyPr rtlCol="0" anchor="ctr"/>
-          <a:lstStyle/>
-          <a:p>
-            <a:pPr algn="ctr"/>
-            <a:endParaRPr lang="en-US"/>
-          </a:p>
-        </p:txBody>
-      </p:sp>
-      <p:sp>
-        <p:nvSpPr>
-          <p:cNvPr id="13" name="Down Arrow 12"/>
-          <p:cNvSpPr/>
-          <p:nvPr/>
-        </p:nvSpPr>
-        <p:spPr>
-          <a:xfrm>
-            <a:off x="7220138" y="2958974"/>
-            <a:ext cx="316871" cy="271604"/>
-          </a:xfrm>
-          <a:prstGeom prst="downArrow">
-            <a:avLst/>
-          </a:prstGeom>
-        </p:spPr>
-        <p:style>
-          <a:lnRef idx="1">
-            <a:schemeClr val="accent4"/>
-          </a:lnRef>
-          <a:fillRef idx="3">
-            <a:schemeClr val="accent4"/>
-          </a:fillRef>
-          <a:effectRef idx="2">
-            <a:schemeClr val="accent4"/>
-          </a:effectRef>
-          <a:fontRef idx="minor">
-            <a:schemeClr val="lt1"/>
-          </a:fontRef>
-        </p:style>
-        <p:txBody>
-          <a:bodyPr rtlCol="0" anchor="ctr"/>
-          <a:lstStyle/>
-          <a:p>
-            <a:pPr algn="ctr"/>
-            <a:endParaRPr lang="en-US"/>
+              <a:rPr lang="en-US" dirty="0" smtClean="0"/>
+              <a:t>Audience: Managers and new users</a:t>
+            </a:r>
+            <a:endParaRPr lang="en-US" dirty="0"/>
           </a:p>
         </p:txBody>
       </p:sp>
     </p:spTree>
     <p:extLst>
       <p:ext uri="{BB962C8B-B14F-4D97-AF65-F5344CB8AC3E}">
-        <p14:creationId xmlns:p14="http://schemas.microsoft.com/office/powerpoint/2010/main" val="439203011"/>
+        <p14:creationId xmlns:p14="http://schemas.microsoft.com/office/powerpoint/2010/main" val="1156120694"/>
       </p:ext>
     </p:extLst>
   </p:cSld>
@@ -6854,6 +5644,1313 @@
                 </a:solidFill>
                 <a:latin typeface="Trebuchet MS" panose="020B0603020202020204" pitchFamily="34" charset="0"/>
               </a:rPr>
+              <a:t>Important files and functions</a:t>
+            </a:r>
+            <a:endParaRPr lang="en-US" dirty="0">
+              <a:solidFill>
+                <a:schemeClr val="accent3"/>
+              </a:solidFill>
+              <a:latin typeface="Trebuchet MS" panose="020B0603020202020204" pitchFamily="34" charset="0"/>
+            </a:endParaRPr>
+          </a:p>
+        </p:txBody>
+      </p:sp>
+      <p:sp>
+        <p:nvSpPr>
+          <p:cNvPr id="5" name="Text Placeholder 2"/>
+          <p:cNvSpPr txBox="1">
+            <a:spLocks/>
+          </p:cNvSpPr>
+          <p:nvPr/>
+        </p:nvSpPr>
+        <p:spPr>
+          <a:xfrm>
+            <a:off x="671757" y="4527868"/>
+            <a:ext cx="8197114" cy="3810086"/>
+          </a:xfrm>
+          <a:prstGeom prst="rect">
+            <a:avLst/>
+          </a:prstGeom>
+        </p:spPr>
+        <p:txBody>
+          <a:bodyPr/>
+          <a:lstStyle>
+            <a:lvl1pPr marL="342900" indent="-342900" algn="l" defTabSz="457200" rtl="0" eaLnBrk="1" latinLnBrk="0" hangingPunct="1">
+              <a:spcBef>
+                <a:spcPct val="20000"/>
+              </a:spcBef>
+              <a:buFont typeface="Lucida Grande"/>
+              <a:buChar char="&gt;"/>
+              <a:defRPr sz="2400" b="1" i="0" kern="1200" baseline="0">
+                <a:solidFill>
+                  <a:schemeClr val="tx1"/>
+                </a:solidFill>
+                <a:latin typeface="Open Sans"/>
+                <a:ea typeface="+mn-ea"/>
+                <a:cs typeface="Open Sans"/>
+              </a:defRPr>
+            </a:lvl1pPr>
+            <a:lvl2pPr marL="742950" indent="-285750" algn="l" defTabSz="457200" rtl="0" eaLnBrk="1" latinLnBrk="0" hangingPunct="1">
+              <a:spcBef>
+                <a:spcPct val="20000"/>
+              </a:spcBef>
+              <a:buFont typeface="Arial"/>
+              <a:buChar char="–"/>
+              <a:defRPr sz="2000" b="1" i="0" kern="1200" baseline="0">
+                <a:solidFill>
+                  <a:schemeClr val="tx1"/>
+                </a:solidFill>
+                <a:latin typeface="Open Sans"/>
+                <a:ea typeface="+mn-ea"/>
+                <a:cs typeface="Open Sans"/>
+              </a:defRPr>
+            </a:lvl2pPr>
+            <a:lvl3pPr marL="1143000" indent="-228600" algn="l" defTabSz="457200" rtl="0" eaLnBrk="1" latinLnBrk="0" hangingPunct="1">
+              <a:spcBef>
+                <a:spcPct val="20000"/>
+              </a:spcBef>
+              <a:buSzPct val="100000"/>
+              <a:buFont typeface="Lucida Grande"/>
+              <a:buChar char="&gt;"/>
+              <a:defRPr sz="1800" b="1" i="0" kern="1200" baseline="0">
+                <a:solidFill>
+                  <a:schemeClr val="tx1"/>
+                </a:solidFill>
+                <a:latin typeface="Open Sans"/>
+                <a:ea typeface="+mn-ea"/>
+                <a:cs typeface="Open Sans"/>
+              </a:defRPr>
+            </a:lvl3pPr>
+            <a:lvl4pPr marL="1600200" indent="-228600" algn="l" defTabSz="457200" rtl="0" eaLnBrk="1" latinLnBrk="0" hangingPunct="1">
+              <a:spcBef>
+                <a:spcPct val="20000"/>
+              </a:spcBef>
+              <a:buFont typeface="Arial"/>
+              <a:buChar char="–"/>
+              <a:defRPr sz="1600" b="1" i="0" kern="1200" baseline="0">
+                <a:solidFill>
+                  <a:schemeClr val="tx1"/>
+                </a:solidFill>
+                <a:latin typeface="Open Sans"/>
+                <a:ea typeface="+mn-ea"/>
+                <a:cs typeface="Open Sans"/>
+              </a:defRPr>
+            </a:lvl4pPr>
+            <a:lvl5pPr marL="2057400" indent="-228600" algn="l" defTabSz="457200" rtl="0" eaLnBrk="1" latinLnBrk="0" hangingPunct="1">
+              <a:spcBef>
+                <a:spcPct val="20000"/>
+              </a:spcBef>
+              <a:buFont typeface="Lucida Grande"/>
+              <a:buChar char="&gt;"/>
+              <a:defRPr sz="1400" b="1" i="0" kern="1200" baseline="0">
+                <a:solidFill>
+                  <a:schemeClr val="tx1"/>
+                </a:solidFill>
+                <a:latin typeface="Open Sans"/>
+                <a:ea typeface="+mn-ea"/>
+                <a:cs typeface="Open Sans"/>
+              </a:defRPr>
+            </a:lvl5pPr>
+            <a:lvl6pPr marL="2514600" indent="-228600" algn="l" defTabSz="457200" rtl="0" eaLnBrk="1" latinLnBrk="0" hangingPunct="1">
+              <a:spcBef>
+                <a:spcPct val="20000"/>
+              </a:spcBef>
+              <a:buFont typeface="Arial"/>
+              <a:buChar char="•"/>
+              <a:defRPr sz="2000" kern="1200">
+                <a:solidFill>
+                  <a:schemeClr val="tx1"/>
+                </a:solidFill>
+                <a:latin typeface="+mn-lt"/>
+                <a:ea typeface="+mn-ea"/>
+                <a:cs typeface="+mn-cs"/>
+              </a:defRPr>
+            </a:lvl6pPr>
+            <a:lvl7pPr marL="2971800" indent="-228600" algn="l" defTabSz="457200" rtl="0" eaLnBrk="1" latinLnBrk="0" hangingPunct="1">
+              <a:spcBef>
+                <a:spcPct val="20000"/>
+              </a:spcBef>
+              <a:buFont typeface="Arial"/>
+              <a:buChar char="•"/>
+              <a:defRPr sz="2000" kern="1200">
+                <a:solidFill>
+                  <a:schemeClr val="tx1"/>
+                </a:solidFill>
+                <a:latin typeface="+mn-lt"/>
+                <a:ea typeface="+mn-ea"/>
+                <a:cs typeface="+mn-cs"/>
+              </a:defRPr>
+            </a:lvl7pPr>
+            <a:lvl8pPr marL="3429000" indent="-228600" algn="l" defTabSz="457200" rtl="0" eaLnBrk="1" latinLnBrk="0" hangingPunct="1">
+              <a:spcBef>
+                <a:spcPct val="20000"/>
+              </a:spcBef>
+              <a:buFont typeface="Arial"/>
+              <a:buChar char="•"/>
+              <a:defRPr sz="2000" kern="1200">
+                <a:solidFill>
+                  <a:schemeClr val="tx1"/>
+                </a:solidFill>
+                <a:latin typeface="+mn-lt"/>
+                <a:ea typeface="+mn-ea"/>
+                <a:cs typeface="+mn-cs"/>
+              </a:defRPr>
+            </a:lvl8pPr>
+            <a:lvl9pPr marL="3886200" indent="-228600" algn="l" defTabSz="457200" rtl="0" eaLnBrk="1" latinLnBrk="0" hangingPunct="1">
+              <a:spcBef>
+                <a:spcPct val="20000"/>
+              </a:spcBef>
+              <a:buFont typeface="Arial"/>
+              <a:buChar char="•"/>
+              <a:defRPr sz="2000" kern="1200">
+                <a:solidFill>
+                  <a:schemeClr val="tx1"/>
+                </a:solidFill>
+                <a:latin typeface="+mn-lt"/>
+                <a:ea typeface="+mn-ea"/>
+                <a:cs typeface="+mn-cs"/>
+              </a:defRPr>
+            </a:lvl9pPr>
+          </a:lstStyle>
+          <a:p>
+            <a:endParaRPr lang="en-US" dirty="0" smtClean="0">
+              <a:latin typeface="Trebuchet MS" panose="020B0603020202020204" pitchFamily="34" charset="0"/>
+            </a:endParaRPr>
+          </a:p>
+        </p:txBody>
+      </p:sp>
+      <p:sp>
+        <p:nvSpPr>
+          <p:cNvPr id="6" name="Text Placeholder 3"/>
+          <p:cNvSpPr txBox="1">
+            <a:spLocks/>
+          </p:cNvSpPr>
+          <p:nvPr/>
+        </p:nvSpPr>
+        <p:spPr>
+          <a:xfrm>
+            <a:off x="664271" y="4765220"/>
+            <a:ext cx="8184662" cy="411171"/>
+          </a:xfrm>
+          <a:prstGeom prst="rect">
+            <a:avLst/>
+          </a:prstGeom>
+        </p:spPr>
+        <p:txBody>
+          <a:bodyPr>
+            <a:noAutofit/>
+          </a:bodyPr>
+          <a:lstStyle>
+            <a:lvl1pPr marL="0" indent="0" algn="l" defTabSz="457200" rtl="0" eaLnBrk="1" latinLnBrk="0" hangingPunct="1">
+              <a:lnSpc>
+                <a:spcPct val="90000"/>
+              </a:lnSpc>
+              <a:spcBef>
+                <a:spcPct val="20000"/>
+              </a:spcBef>
+              <a:buFont typeface="Arial"/>
+              <a:buNone/>
+              <a:defRPr sz="2400" b="0" i="0" kern="1200" baseline="0">
+                <a:solidFill>
+                  <a:schemeClr val="tx1"/>
+                </a:solidFill>
+                <a:latin typeface="Uni Sans Regular"/>
+                <a:ea typeface="+mn-ea"/>
+                <a:cs typeface="Uni Sans Regular"/>
+              </a:defRPr>
+            </a:lvl1pPr>
+            <a:lvl2pPr marL="457200" indent="0" algn="l" defTabSz="457200" rtl="0" eaLnBrk="1" latinLnBrk="0" hangingPunct="1">
+              <a:spcBef>
+                <a:spcPct val="20000"/>
+              </a:spcBef>
+              <a:buFont typeface="Arial"/>
+              <a:buNone/>
+              <a:defRPr sz="2800" b="0" i="0" kern="1200">
+                <a:solidFill>
+                  <a:srgbClr val="E8D3A2"/>
+                </a:solidFill>
+                <a:latin typeface="Encode Sans Normal Black"/>
+                <a:ea typeface="+mn-ea"/>
+                <a:cs typeface="Encode Sans Normal Black"/>
+              </a:defRPr>
+            </a:lvl2pPr>
+            <a:lvl3pPr marL="914400" indent="0" algn="l" defTabSz="457200" rtl="0" eaLnBrk="1" latinLnBrk="0" hangingPunct="1">
+              <a:spcBef>
+                <a:spcPct val="20000"/>
+              </a:spcBef>
+              <a:buFont typeface="Arial"/>
+              <a:buNone/>
+              <a:defRPr sz="2400" b="0" i="0" kern="1200">
+                <a:solidFill>
+                  <a:srgbClr val="E8D3A2"/>
+                </a:solidFill>
+                <a:latin typeface="Encode Sans Normal Black"/>
+                <a:ea typeface="+mn-ea"/>
+                <a:cs typeface="Encode Sans Normal Black"/>
+              </a:defRPr>
+            </a:lvl3pPr>
+            <a:lvl4pPr marL="1371600" indent="0" algn="l" defTabSz="457200" rtl="0" eaLnBrk="1" latinLnBrk="0" hangingPunct="1">
+              <a:spcBef>
+                <a:spcPct val="20000"/>
+              </a:spcBef>
+              <a:buFont typeface="Arial"/>
+              <a:buNone/>
+              <a:defRPr sz="2000" b="0" i="0" kern="1200">
+                <a:solidFill>
+                  <a:srgbClr val="E8D3A2"/>
+                </a:solidFill>
+                <a:latin typeface="Encode Sans Normal Black"/>
+                <a:ea typeface="+mn-ea"/>
+                <a:cs typeface="Encode Sans Normal Black"/>
+              </a:defRPr>
+            </a:lvl4pPr>
+            <a:lvl5pPr marL="1828800" indent="0" algn="l" defTabSz="457200" rtl="0" eaLnBrk="1" latinLnBrk="0" hangingPunct="1">
+              <a:spcBef>
+                <a:spcPct val="20000"/>
+              </a:spcBef>
+              <a:buFont typeface="Arial"/>
+              <a:buNone/>
+              <a:defRPr sz="2000" b="0" i="0" kern="1200">
+                <a:solidFill>
+                  <a:srgbClr val="E8D3A2"/>
+                </a:solidFill>
+                <a:latin typeface="Encode Sans Normal Black"/>
+                <a:ea typeface="+mn-ea"/>
+                <a:cs typeface="Encode Sans Normal Black"/>
+              </a:defRPr>
+            </a:lvl5pPr>
+            <a:lvl6pPr marL="2514600" indent="-228600" algn="l" defTabSz="457200" rtl="0" eaLnBrk="1" latinLnBrk="0" hangingPunct="1">
+              <a:spcBef>
+                <a:spcPct val="20000"/>
+              </a:spcBef>
+              <a:buFont typeface="Arial"/>
+              <a:buChar char="•"/>
+              <a:defRPr sz="2000" kern="1200">
+                <a:solidFill>
+                  <a:schemeClr val="tx1"/>
+                </a:solidFill>
+                <a:latin typeface="+mn-lt"/>
+                <a:ea typeface="+mn-ea"/>
+                <a:cs typeface="+mn-cs"/>
+              </a:defRPr>
+            </a:lvl6pPr>
+            <a:lvl7pPr marL="2971800" indent="-228600" algn="l" defTabSz="457200" rtl="0" eaLnBrk="1" latinLnBrk="0" hangingPunct="1">
+              <a:spcBef>
+                <a:spcPct val="20000"/>
+              </a:spcBef>
+              <a:buFont typeface="Arial"/>
+              <a:buChar char="•"/>
+              <a:defRPr sz="2000" kern="1200">
+                <a:solidFill>
+                  <a:schemeClr val="tx1"/>
+                </a:solidFill>
+                <a:latin typeface="+mn-lt"/>
+                <a:ea typeface="+mn-ea"/>
+                <a:cs typeface="+mn-cs"/>
+              </a:defRPr>
+            </a:lvl7pPr>
+            <a:lvl8pPr marL="3429000" indent="-228600" algn="l" defTabSz="457200" rtl="0" eaLnBrk="1" latinLnBrk="0" hangingPunct="1">
+              <a:spcBef>
+                <a:spcPct val="20000"/>
+              </a:spcBef>
+              <a:buFont typeface="Arial"/>
+              <a:buChar char="•"/>
+              <a:defRPr sz="2000" kern="1200">
+                <a:solidFill>
+                  <a:schemeClr val="tx1"/>
+                </a:solidFill>
+                <a:latin typeface="+mn-lt"/>
+                <a:ea typeface="+mn-ea"/>
+                <a:cs typeface="+mn-cs"/>
+              </a:defRPr>
+            </a:lvl8pPr>
+            <a:lvl9pPr marL="3886200" indent="-228600" algn="l" defTabSz="457200" rtl="0" eaLnBrk="1" latinLnBrk="0" hangingPunct="1">
+              <a:spcBef>
+                <a:spcPct val="20000"/>
+              </a:spcBef>
+              <a:buFont typeface="Arial"/>
+              <a:buChar char="•"/>
+              <a:defRPr sz="2000" kern="1200">
+                <a:solidFill>
+                  <a:schemeClr val="tx1"/>
+                </a:solidFill>
+                <a:latin typeface="+mn-lt"/>
+                <a:ea typeface="+mn-ea"/>
+                <a:cs typeface="+mn-cs"/>
+              </a:defRPr>
+            </a:lvl9pPr>
+          </a:lstStyle>
+          <a:p>
+            <a:endParaRPr lang="en-US" dirty="0">
+              <a:latin typeface="Trebuchet MS" panose="020B0603020202020204" pitchFamily="34" charset="0"/>
+            </a:endParaRPr>
+          </a:p>
+        </p:txBody>
+      </p:sp>
+      <p:sp>
+        <p:nvSpPr>
+          <p:cNvPr id="3" name="Rounded Rectangle 2"/>
+          <p:cNvSpPr/>
+          <p:nvPr/>
+        </p:nvSpPr>
+        <p:spPr>
+          <a:xfrm>
+            <a:off x="644332" y="1805931"/>
+            <a:ext cx="8028887" cy="1036857"/>
+          </a:xfrm>
+          <a:prstGeom prst="roundRect">
+            <a:avLst/>
+          </a:prstGeom>
+        </p:spPr>
+        <p:style>
+          <a:lnRef idx="1">
+            <a:schemeClr val="accent2"/>
+          </a:lnRef>
+          <a:fillRef idx="3">
+            <a:schemeClr val="accent2"/>
+          </a:fillRef>
+          <a:effectRef idx="2">
+            <a:schemeClr val="accent2"/>
+          </a:effectRef>
+          <a:fontRef idx="minor">
+            <a:schemeClr val="lt1"/>
+          </a:fontRef>
+        </p:style>
+        <p:txBody>
+          <a:bodyPr rtlCol="0" anchor="t"/>
+          <a:lstStyle/>
+          <a:p>
+            <a:r>
+              <a:rPr lang="en-US" sz="1200" b="1" dirty="0" err="1" smtClean="0">
+                <a:solidFill>
+                  <a:schemeClr val="bg1"/>
+                </a:solidFill>
+              </a:rPr>
+              <a:t>textFunctions.r</a:t>
+            </a:r>
+            <a:r>
+              <a:rPr lang="en-US" sz="1200" dirty="0" smtClean="0">
+                <a:solidFill>
+                  <a:schemeClr val="bg1"/>
+                </a:solidFill>
+              </a:rPr>
+              <a:t>: This file contains all important text processing functions for creating a corpus and term-document matrix. All </a:t>
+            </a:r>
+            <a:r>
+              <a:rPr lang="en-US" sz="1200" dirty="0" err="1" smtClean="0">
+                <a:solidFill>
+                  <a:schemeClr val="bg1"/>
+                </a:solidFill>
+              </a:rPr>
+              <a:t>wordcounting</a:t>
+            </a:r>
+            <a:r>
+              <a:rPr lang="en-US" sz="1200" dirty="0" smtClean="0">
+                <a:solidFill>
+                  <a:schemeClr val="bg1"/>
+                </a:solidFill>
+              </a:rPr>
+              <a:t> functions are here. These functions are also used by all other files to prepare documents for processing</a:t>
+            </a:r>
+          </a:p>
+          <a:p>
+            <a:r>
+              <a:rPr lang="en-US" sz="1200" dirty="0" err="1" smtClean="0">
+                <a:solidFill>
+                  <a:schemeClr val="bg1"/>
+                </a:solidFill>
+              </a:rPr>
+              <a:t>Selecred</a:t>
+            </a:r>
+            <a:r>
+              <a:rPr lang="en-US" sz="1200" dirty="0" smtClean="0">
+                <a:solidFill>
+                  <a:schemeClr val="bg1"/>
+                </a:solidFill>
+              </a:rPr>
+              <a:t> Functions: </a:t>
+            </a:r>
+            <a:r>
+              <a:rPr lang="en-US" sz="1200" dirty="0" err="1" smtClean="0">
+                <a:solidFill>
+                  <a:schemeClr val="bg1"/>
+                </a:solidFill>
+              </a:rPr>
+              <a:t>example_documents</a:t>
+            </a:r>
+            <a:r>
+              <a:rPr lang="en-US" sz="1200" dirty="0" smtClean="0">
+                <a:solidFill>
+                  <a:schemeClr val="bg1"/>
+                </a:solidFill>
+              </a:rPr>
+              <a:t>(), </a:t>
+            </a:r>
+            <a:r>
+              <a:rPr lang="en-US" sz="1200" dirty="0" err="1" smtClean="0">
+                <a:solidFill>
+                  <a:schemeClr val="bg1"/>
+                </a:solidFill>
+              </a:rPr>
+              <a:t>getTextR</a:t>
+            </a:r>
+            <a:r>
+              <a:rPr lang="en-US" sz="1200" dirty="0" smtClean="0">
+                <a:solidFill>
+                  <a:schemeClr val="bg1"/>
+                </a:solidFill>
+              </a:rPr>
+              <a:t>(), </a:t>
+            </a:r>
+            <a:r>
+              <a:rPr lang="en-US" sz="1200" dirty="0" err="1" smtClean="0">
+                <a:solidFill>
+                  <a:schemeClr val="bg1"/>
+                </a:solidFill>
+              </a:rPr>
+              <a:t>readMails</a:t>
+            </a:r>
+            <a:r>
+              <a:rPr lang="en-US" sz="1200" dirty="0" smtClean="0">
+                <a:solidFill>
+                  <a:schemeClr val="bg1"/>
+                </a:solidFill>
+              </a:rPr>
+              <a:t>(), </a:t>
+            </a:r>
+            <a:r>
+              <a:rPr lang="en-US" sz="1200" dirty="0" err="1" smtClean="0">
+                <a:solidFill>
+                  <a:schemeClr val="bg1"/>
+                </a:solidFill>
+              </a:rPr>
+              <a:t>makeworking</a:t>
+            </a:r>
+            <a:r>
+              <a:rPr lang="en-US" sz="1200" dirty="0" smtClean="0">
+                <a:solidFill>
+                  <a:schemeClr val="bg1"/>
+                </a:solidFill>
+              </a:rPr>
+              <a:t>(), </a:t>
+            </a:r>
+            <a:r>
+              <a:rPr lang="en-US" sz="1200" dirty="0" err="1" smtClean="0">
+                <a:solidFill>
+                  <a:schemeClr val="bg1"/>
+                </a:solidFill>
+              </a:rPr>
+              <a:t>read_docxtm</a:t>
+            </a:r>
+            <a:r>
+              <a:rPr lang="en-US" sz="1200" dirty="0" smtClean="0">
+                <a:solidFill>
+                  <a:schemeClr val="bg1"/>
+                </a:solidFill>
+              </a:rPr>
+              <a:t>(), readPDF2(), </a:t>
+            </a:r>
+            <a:r>
+              <a:rPr lang="en-US" sz="1200" dirty="0" err="1" smtClean="0">
+                <a:solidFill>
+                  <a:schemeClr val="bg1"/>
+                </a:solidFill>
+              </a:rPr>
+              <a:t>allDocs</a:t>
+            </a:r>
+            <a:r>
+              <a:rPr lang="en-US" sz="1200" dirty="0" smtClean="0">
+                <a:solidFill>
+                  <a:schemeClr val="bg1"/>
+                </a:solidFill>
+              </a:rPr>
+              <a:t>(), </a:t>
+            </a:r>
+            <a:r>
+              <a:rPr lang="en-US" sz="1200" dirty="0" err="1" smtClean="0">
+                <a:solidFill>
+                  <a:schemeClr val="bg1"/>
+                </a:solidFill>
+              </a:rPr>
+              <a:t>doc_clean_process</a:t>
+            </a:r>
+            <a:r>
+              <a:rPr lang="en-US" sz="1200" dirty="0" smtClean="0">
+                <a:solidFill>
+                  <a:schemeClr val="bg1"/>
+                </a:solidFill>
+              </a:rPr>
+              <a:t>(), </a:t>
+            </a:r>
+            <a:r>
+              <a:rPr lang="en-US" sz="1200" dirty="0" err="1" smtClean="0">
+                <a:solidFill>
+                  <a:schemeClr val="bg1"/>
+                </a:solidFill>
+              </a:rPr>
+              <a:t>assocPTable</a:t>
+            </a:r>
+            <a:r>
+              <a:rPr lang="en-US" sz="1200" dirty="0" smtClean="0">
+                <a:solidFill>
+                  <a:schemeClr val="bg1"/>
+                </a:solidFill>
+              </a:rPr>
+              <a:t>(), </a:t>
+            </a:r>
+            <a:r>
+              <a:rPr lang="en-US" sz="1200" dirty="0" err="1" smtClean="0">
+                <a:solidFill>
+                  <a:schemeClr val="bg1"/>
+                </a:solidFill>
+              </a:rPr>
+              <a:t>assocPrettyOneStep</a:t>
+            </a:r>
+            <a:r>
+              <a:rPr lang="en-US" sz="1200" dirty="0" smtClean="0">
+                <a:solidFill>
+                  <a:schemeClr val="bg1"/>
+                </a:solidFill>
+              </a:rPr>
+              <a:t>(), OCR_DOCS()</a:t>
+            </a:r>
+          </a:p>
+        </p:txBody>
+      </p:sp>
+      <p:sp>
+        <p:nvSpPr>
+          <p:cNvPr id="9" name="Rounded Rectangle 8"/>
+          <p:cNvSpPr/>
+          <p:nvPr/>
+        </p:nvSpPr>
+        <p:spPr>
+          <a:xfrm>
+            <a:off x="644332" y="3285211"/>
+            <a:ext cx="2524381" cy="2816825"/>
+          </a:xfrm>
+          <a:prstGeom prst="roundRect">
+            <a:avLst/>
+          </a:prstGeom>
+        </p:spPr>
+        <p:style>
+          <a:lnRef idx="1">
+            <a:schemeClr val="accent2"/>
+          </a:lnRef>
+          <a:fillRef idx="3">
+            <a:schemeClr val="accent2"/>
+          </a:fillRef>
+          <a:effectRef idx="2">
+            <a:schemeClr val="accent2"/>
+          </a:effectRef>
+          <a:fontRef idx="minor">
+            <a:schemeClr val="lt1"/>
+          </a:fontRef>
+        </p:style>
+        <p:txBody>
+          <a:bodyPr rtlCol="0" anchor="t"/>
+          <a:lstStyle/>
+          <a:p>
+            <a:r>
+              <a:rPr lang="en-US" sz="1200" b="1" dirty="0" err="1">
+                <a:solidFill>
+                  <a:schemeClr val="bg1"/>
+                </a:solidFill>
+              </a:rPr>
+              <a:t>s</a:t>
+            </a:r>
+            <a:r>
+              <a:rPr lang="en-US" sz="1200" b="1" dirty="0" err="1" smtClean="0">
+                <a:solidFill>
+                  <a:schemeClr val="bg1"/>
+                </a:solidFill>
+              </a:rPr>
+              <a:t>pacy_functions.r</a:t>
+            </a:r>
+            <a:r>
+              <a:rPr lang="en-US" sz="1200" dirty="0" smtClean="0">
+                <a:solidFill>
+                  <a:schemeClr val="bg1"/>
+                </a:solidFill>
+              </a:rPr>
+              <a:t>: contains the grammar parsing portion of the topic model code. </a:t>
+            </a:r>
+            <a:r>
+              <a:rPr lang="en-US" sz="1200" dirty="0">
+                <a:solidFill>
+                  <a:schemeClr val="bg1"/>
+                </a:solidFill>
+              </a:rPr>
+              <a:t>U</a:t>
+            </a:r>
+            <a:r>
+              <a:rPr lang="en-US" sz="1200" dirty="0" smtClean="0">
+                <a:solidFill>
+                  <a:schemeClr val="bg1"/>
+                </a:solidFill>
+              </a:rPr>
+              <a:t>ses functions from </a:t>
+            </a:r>
+            <a:r>
+              <a:rPr lang="en-US" sz="1200" dirty="0" err="1" smtClean="0">
+                <a:solidFill>
+                  <a:schemeClr val="bg1"/>
+                </a:solidFill>
+              </a:rPr>
+              <a:t>textFunctions.r</a:t>
+            </a:r>
+            <a:r>
+              <a:rPr lang="en-US" sz="1200" dirty="0" smtClean="0">
+                <a:solidFill>
+                  <a:schemeClr val="bg1"/>
+                </a:solidFill>
+              </a:rPr>
+              <a:t> and then its own functions to invoke the “Spacy” package for grammar processing. Important functions:</a:t>
+            </a:r>
+          </a:p>
+          <a:p>
+            <a:pPr marL="285750" indent="-285750">
+              <a:buFont typeface="Arial" panose="020B0604020202020204" pitchFamily="34" charset="0"/>
+              <a:buChar char="•"/>
+            </a:pPr>
+            <a:r>
+              <a:rPr lang="en-US" sz="1200" dirty="0" err="1" smtClean="0">
+                <a:solidFill>
+                  <a:schemeClr val="bg1"/>
+                </a:solidFill>
+              </a:rPr>
+              <a:t>SPCY_PreTopicFrame</a:t>
+            </a:r>
+            <a:r>
+              <a:rPr lang="en-US" sz="1200" dirty="0" smtClean="0">
+                <a:solidFill>
+                  <a:schemeClr val="bg1"/>
+                </a:solidFill>
+              </a:rPr>
+              <a:t>()</a:t>
+            </a:r>
+          </a:p>
+          <a:p>
+            <a:pPr marL="285750" indent="-285750">
+              <a:buFont typeface="Arial" panose="020B0604020202020204" pitchFamily="34" charset="0"/>
+              <a:buChar char="•"/>
+            </a:pPr>
+            <a:r>
+              <a:rPr lang="en-US" sz="1200" dirty="0" err="1">
+                <a:solidFill>
+                  <a:schemeClr val="bg1"/>
+                </a:solidFill>
+              </a:rPr>
+              <a:t>m</a:t>
+            </a:r>
+            <a:r>
+              <a:rPr lang="en-US" sz="1200" dirty="0" err="1" smtClean="0">
+                <a:solidFill>
+                  <a:schemeClr val="bg1"/>
+                </a:solidFill>
+              </a:rPr>
+              <a:t>aketermkeywords</a:t>
+            </a:r>
+            <a:r>
+              <a:rPr lang="en-US" sz="1200" dirty="0" smtClean="0">
+                <a:solidFill>
+                  <a:schemeClr val="bg1"/>
+                </a:solidFill>
+              </a:rPr>
+              <a:t>()</a:t>
+            </a:r>
+          </a:p>
+          <a:p>
+            <a:pPr marL="285750" indent="-285750">
+              <a:buFont typeface="Arial" panose="020B0604020202020204" pitchFamily="34" charset="0"/>
+              <a:buChar char="•"/>
+            </a:pPr>
+            <a:r>
+              <a:rPr lang="en-US" sz="1200" dirty="0" err="1">
+                <a:solidFill>
+                  <a:schemeClr val="bg1"/>
+                </a:solidFill>
+              </a:rPr>
+              <a:t>s</a:t>
+            </a:r>
+            <a:r>
+              <a:rPr lang="en-US" sz="1200" dirty="0" err="1" smtClean="0">
+                <a:solidFill>
+                  <a:schemeClr val="bg1"/>
+                </a:solidFill>
+              </a:rPr>
+              <a:t>entkeeper</a:t>
+            </a:r>
+            <a:r>
+              <a:rPr lang="en-US" sz="1200" dirty="0" smtClean="0">
+                <a:solidFill>
+                  <a:schemeClr val="bg1"/>
+                </a:solidFill>
+              </a:rPr>
+              <a:t>()</a:t>
+            </a:r>
+          </a:p>
+          <a:p>
+            <a:pPr marL="285750" indent="-285750">
+              <a:buFont typeface="Arial" panose="020B0604020202020204" pitchFamily="34" charset="0"/>
+              <a:buChar char="•"/>
+            </a:pPr>
+            <a:r>
+              <a:rPr lang="en-US" sz="1200" dirty="0" err="1" smtClean="0">
+                <a:solidFill>
+                  <a:schemeClr val="bg1"/>
+                </a:solidFill>
+              </a:rPr>
+              <a:t>conligraph</a:t>
+            </a:r>
+            <a:r>
+              <a:rPr lang="en-US" sz="1200" dirty="0" smtClean="0">
+                <a:solidFill>
+                  <a:schemeClr val="bg1"/>
+                </a:solidFill>
+              </a:rPr>
+              <a:t>()</a:t>
+            </a:r>
+          </a:p>
+        </p:txBody>
+      </p:sp>
+      <p:sp>
+        <p:nvSpPr>
+          <p:cNvPr id="10" name="Rounded Rectangle 9"/>
+          <p:cNvSpPr/>
+          <p:nvPr/>
+        </p:nvSpPr>
+        <p:spPr>
+          <a:xfrm>
+            <a:off x="3395314" y="3285208"/>
+            <a:ext cx="2498493" cy="2816828"/>
+          </a:xfrm>
+          <a:prstGeom prst="roundRect">
+            <a:avLst/>
+          </a:prstGeom>
+        </p:spPr>
+        <p:style>
+          <a:lnRef idx="1">
+            <a:schemeClr val="accent2"/>
+          </a:lnRef>
+          <a:fillRef idx="3">
+            <a:schemeClr val="accent2"/>
+          </a:fillRef>
+          <a:effectRef idx="2">
+            <a:schemeClr val="accent2"/>
+          </a:effectRef>
+          <a:fontRef idx="minor">
+            <a:schemeClr val="lt1"/>
+          </a:fontRef>
+        </p:style>
+        <p:txBody>
+          <a:bodyPr rtlCol="0" anchor="t"/>
+          <a:lstStyle/>
+          <a:p>
+            <a:r>
+              <a:rPr lang="en-US" sz="1200" b="1" dirty="0" err="1" smtClean="0">
+                <a:solidFill>
+                  <a:schemeClr val="bg1"/>
+                </a:solidFill>
+              </a:rPr>
+              <a:t>topicFunctions.r</a:t>
+            </a:r>
+            <a:r>
+              <a:rPr lang="en-US" sz="1200" dirty="0" smtClean="0">
+                <a:solidFill>
+                  <a:schemeClr val="bg1"/>
+                </a:solidFill>
+              </a:rPr>
+              <a:t>: contains more grammar parsing but uses the </a:t>
+            </a:r>
+            <a:r>
+              <a:rPr lang="en-US" sz="1200" dirty="0" err="1" smtClean="0">
+                <a:solidFill>
+                  <a:schemeClr val="bg1"/>
+                </a:solidFill>
+              </a:rPr>
+              <a:t>openNLP</a:t>
+            </a:r>
+            <a:r>
+              <a:rPr lang="en-US" sz="1200" dirty="0" smtClean="0">
+                <a:solidFill>
+                  <a:schemeClr val="bg1"/>
+                </a:solidFill>
+              </a:rPr>
+              <a:t> and IBM </a:t>
+            </a:r>
+            <a:r>
+              <a:rPr lang="en-US" sz="1200" dirty="0" err="1" smtClean="0">
+                <a:solidFill>
+                  <a:schemeClr val="bg1"/>
+                </a:solidFill>
+              </a:rPr>
+              <a:t>watson</a:t>
+            </a:r>
+            <a:r>
+              <a:rPr lang="en-US" sz="1200" dirty="0" smtClean="0">
+                <a:solidFill>
+                  <a:schemeClr val="bg1"/>
+                </a:solidFill>
+              </a:rPr>
+              <a:t> packages instead of the Spacy package for grammar parsing and sentiment analysis Important functions:</a:t>
+            </a:r>
+          </a:p>
+          <a:p>
+            <a:pPr marL="285750" indent="-285750">
+              <a:buFont typeface="Arial" panose="020B0604020202020204" pitchFamily="34" charset="0"/>
+              <a:buChar char="•"/>
+            </a:pPr>
+            <a:r>
+              <a:rPr lang="en-US" sz="1200" dirty="0" smtClean="0">
+                <a:solidFill>
+                  <a:schemeClr val="bg1"/>
+                </a:solidFill>
+              </a:rPr>
+              <a:t>PreTopicFrame2()</a:t>
+            </a:r>
+          </a:p>
+          <a:p>
+            <a:pPr marL="285750" indent="-285750">
+              <a:buFont typeface="Arial" panose="020B0604020202020204" pitchFamily="34" charset="0"/>
+              <a:buChar char="•"/>
+            </a:pPr>
+            <a:r>
+              <a:rPr lang="en-US" sz="1200" dirty="0" err="1">
+                <a:solidFill>
+                  <a:schemeClr val="bg1"/>
+                </a:solidFill>
+              </a:rPr>
+              <a:t>AnnotateVerbsTopicJoin</a:t>
+            </a:r>
+            <a:r>
+              <a:rPr lang="en-US" sz="1200" dirty="0">
+                <a:solidFill>
+                  <a:schemeClr val="bg1"/>
+                </a:solidFill>
+              </a:rPr>
+              <a:t>()</a:t>
+            </a:r>
+            <a:endParaRPr lang="en-US" sz="1200" dirty="0" smtClean="0">
+              <a:solidFill>
+                <a:schemeClr val="bg1"/>
+              </a:solidFill>
+            </a:endParaRPr>
+          </a:p>
+          <a:p>
+            <a:pPr marL="285750" indent="-285750">
+              <a:buFont typeface="Arial" panose="020B0604020202020204" pitchFamily="34" charset="0"/>
+              <a:buChar char="•"/>
+            </a:pPr>
+            <a:r>
+              <a:rPr lang="en-US" sz="1200" dirty="0" err="1">
+                <a:solidFill>
+                  <a:schemeClr val="bg1"/>
+                </a:solidFill>
+              </a:rPr>
+              <a:t>idtopics</a:t>
+            </a:r>
+            <a:r>
+              <a:rPr lang="en-US" sz="1200" dirty="0">
+                <a:solidFill>
+                  <a:schemeClr val="bg1"/>
+                </a:solidFill>
+              </a:rPr>
+              <a:t>()</a:t>
+            </a:r>
+            <a:endParaRPr lang="en-US" sz="1200" dirty="0" smtClean="0">
+              <a:solidFill>
+                <a:schemeClr val="bg1"/>
+              </a:solidFill>
+            </a:endParaRPr>
+          </a:p>
+          <a:p>
+            <a:pPr marL="285750" indent="-285750">
+              <a:buFont typeface="Arial" panose="020B0604020202020204" pitchFamily="34" charset="0"/>
+              <a:buChar char="•"/>
+            </a:pPr>
+            <a:r>
+              <a:rPr lang="en-US" sz="1200" dirty="0" err="1">
+                <a:solidFill>
+                  <a:schemeClr val="bg1"/>
+                </a:solidFill>
+              </a:rPr>
+              <a:t>data_mapper</a:t>
+            </a:r>
+            <a:r>
+              <a:rPr lang="en-US" sz="1200" dirty="0">
+                <a:solidFill>
+                  <a:schemeClr val="bg1"/>
+                </a:solidFill>
+              </a:rPr>
+              <a:t>()</a:t>
+            </a:r>
+            <a:endParaRPr lang="en-US" sz="1200" dirty="0" smtClean="0">
+              <a:solidFill>
+                <a:schemeClr val="bg1"/>
+              </a:solidFill>
+            </a:endParaRPr>
+          </a:p>
+        </p:txBody>
+      </p:sp>
+      <p:sp>
+        <p:nvSpPr>
+          <p:cNvPr id="11" name="Rounded Rectangle 10"/>
+          <p:cNvSpPr/>
+          <p:nvPr/>
+        </p:nvSpPr>
+        <p:spPr>
+          <a:xfrm>
+            <a:off x="6083929" y="3285209"/>
+            <a:ext cx="2589290" cy="2816827"/>
+          </a:xfrm>
+          <a:prstGeom prst="roundRect">
+            <a:avLst/>
+          </a:prstGeom>
+        </p:spPr>
+        <p:style>
+          <a:lnRef idx="1">
+            <a:schemeClr val="accent2"/>
+          </a:lnRef>
+          <a:fillRef idx="3">
+            <a:schemeClr val="accent2"/>
+          </a:fillRef>
+          <a:effectRef idx="2">
+            <a:schemeClr val="accent2"/>
+          </a:effectRef>
+          <a:fontRef idx="minor">
+            <a:schemeClr val="lt1"/>
+          </a:fontRef>
+        </p:style>
+        <p:txBody>
+          <a:bodyPr rtlCol="0" anchor="t"/>
+          <a:lstStyle/>
+          <a:p>
+            <a:r>
+              <a:rPr lang="en-US" sz="1200" b="1" dirty="0" err="1" smtClean="0">
+                <a:solidFill>
+                  <a:schemeClr val="bg1"/>
+                </a:solidFill>
+              </a:rPr>
+              <a:t>formFunctions.r</a:t>
+            </a:r>
+            <a:r>
+              <a:rPr lang="en-US" sz="1200" dirty="0" smtClean="0">
+                <a:solidFill>
+                  <a:schemeClr val="bg1"/>
+                </a:solidFill>
+              </a:rPr>
+              <a:t>: contains functions for extracting data specifically from Gates Foundation proposals like Outcomes tables and   from structured </a:t>
+            </a:r>
+            <a:r>
+              <a:rPr lang="en-US" sz="1200" dirty="0" err="1" smtClean="0">
+                <a:solidFill>
+                  <a:schemeClr val="bg1"/>
+                </a:solidFill>
+              </a:rPr>
+              <a:t>docx</a:t>
+            </a:r>
+            <a:r>
+              <a:rPr lang="en-US" sz="1200" dirty="0" smtClean="0">
+                <a:solidFill>
+                  <a:schemeClr val="bg1"/>
+                </a:solidFill>
+              </a:rPr>
+              <a:t> files as provided by the Gates foundation. Important functions:</a:t>
+            </a:r>
+          </a:p>
+          <a:p>
+            <a:pPr marL="285750" indent="-285750">
+              <a:buFont typeface="Arial" panose="020B0604020202020204" pitchFamily="34" charset="0"/>
+              <a:buChar char="•"/>
+            </a:pPr>
+            <a:r>
+              <a:rPr lang="en-US" sz="1200" dirty="0" err="1">
+                <a:solidFill>
+                  <a:schemeClr val="bg1"/>
+                </a:solidFill>
+              </a:rPr>
+              <a:t>docx_table_view</a:t>
+            </a:r>
+            <a:r>
+              <a:rPr lang="en-US" sz="1200" dirty="0">
+                <a:solidFill>
+                  <a:schemeClr val="bg1"/>
+                </a:solidFill>
+              </a:rPr>
+              <a:t>()</a:t>
+            </a:r>
+            <a:endParaRPr lang="en-US" sz="1200" dirty="0" smtClean="0">
+              <a:solidFill>
+                <a:schemeClr val="bg1"/>
+              </a:solidFill>
+            </a:endParaRPr>
+          </a:p>
+          <a:p>
+            <a:pPr marL="285750" indent="-285750">
+              <a:buFont typeface="Arial" panose="020B0604020202020204" pitchFamily="34" charset="0"/>
+              <a:buChar char="•"/>
+            </a:pPr>
+            <a:r>
+              <a:rPr lang="en-US" sz="1200" dirty="0" err="1">
+                <a:solidFill>
+                  <a:schemeClr val="bg1"/>
+                </a:solidFill>
+              </a:rPr>
+              <a:t>outcome_extractor</a:t>
+            </a:r>
+            <a:r>
+              <a:rPr lang="en-US" sz="1200" dirty="0">
+                <a:solidFill>
+                  <a:schemeClr val="bg1"/>
+                </a:solidFill>
+              </a:rPr>
+              <a:t>()</a:t>
+            </a:r>
+            <a:endParaRPr lang="en-US" sz="1200" dirty="0" smtClean="0">
+              <a:solidFill>
+                <a:schemeClr val="bg1"/>
+              </a:solidFill>
+            </a:endParaRPr>
+          </a:p>
+          <a:p>
+            <a:pPr marL="285750" indent="-285750">
+              <a:buFont typeface="Arial" panose="020B0604020202020204" pitchFamily="34" charset="0"/>
+              <a:buChar char="•"/>
+            </a:pPr>
+            <a:r>
+              <a:rPr lang="en-US" sz="1200" dirty="0" err="1">
+                <a:solidFill>
+                  <a:schemeClr val="bg1"/>
+                </a:solidFill>
+              </a:rPr>
+              <a:t>cell_extractor</a:t>
+            </a:r>
+            <a:r>
+              <a:rPr lang="en-US" sz="1200" dirty="0">
+                <a:solidFill>
+                  <a:schemeClr val="bg1"/>
+                </a:solidFill>
+              </a:rPr>
+              <a:t>()</a:t>
+            </a:r>
+            <a:endParaRPr lang="en-US" sz="1200" dirty="0" smtClean="0">
+              <a:solidFill>
+                <a:schemeClr val="bg1"/>
+              </a:solidFill>
+            </a:endParaRPr>
+          </a:p>
+          <a:p>
+            <a:pPr marL="285750" indent="-285750">
+              <a:buFont typeface="Arial" panose="020B0604020202020204" pitchFamily="34" charset="0"/>
+              <a:buChar char="•"/>
+            </a:pPr>
+            <a:r>
+              <a:rPr lang="en-US" sz="1200" dirty="0" err="1">
+                <a:solidFill>
+                  <a:schemeClr val="bg1"/>
+                </a:solidFill>
+              </a:rPr>
+              <a:t>docx_man_ex</a:t>
+            </a:r>
+            <a:r>
+              <a:rPr lang="en-US" sz="1200" dirty="0" smtClean="0">
+                <a:solidFill>
+                  <a:schemeClr val="bg1"/>
+                </a:solidFill>
+              </a:rPr>
+              <a:t>()</a:t>
+            </a:r>
+          </a:p>
+          <a:p>
+            <a:pPr marL="285750" indent="-285750">
+              <a:buFont typeface="Arial" panose="020B0604020202020204" pitchFamily="34" charset="0"/>
+              <a:buChar char="•"/>
+            </a:pPr>
+            <a:r>
+              <a:rPr lang="en-US" sz="1200" dirty="0" err="1" smtClean="0">
+                <a:solidFill>
+                  <a:schemeClr val="bg1"/>
+                </a:solidFill>
+              </a:rPr>
+              <a:t>Formcluster</a:t>
+            </a:r>
+            <a:r>
+              <a:rPr lang="en-US" sz="1200" dirty="0" smtClean="0">
+                <a:solidFill>
+                  <a:schemeClr val="bg1"/>
+                </a:solidFill>
+              </a:rPr>
+              <a:t>()</a:t>
+            </a:r>
+          </a:p>
+        </p:txBody>
+      </p:sp>
+      <p:sp>
+        <p:nvSpPr>
+          <p:cNvPr id="4" name="Down Arrow 3"/>
+          <p:cNvSpPr/>
+          <p:nvPr/>
+        </p:nvSpPr>
+        <p:spPr>
+          <a:xfrm>
+            <a:off x="1747319" y="2942376"/>
+            <a:ext cx="316871" cy="271604"/>
+          </a:xfrm>
+          <a:prstGeom prst="downArrow">
+            <a:avLst/>
+          </a:prstGeom>
+        </p:spPr>
+        <p:style>
+          <a:lnRef idx="1">
+            <a:schemeClr val="accent4"/>
+          </a:lnRef>
+          <a:fillRef idx="3">
+            <a:schemeClr val="accent4"/>
+          </a:fillRef>
+          <a:effectRef idx="2">
+            <a:schemeClr val="accent4"/>
+          </a:effectRef>
+          <a:fontRef idx="minor">
+            <a:schemeClr val="lt1"/>
+          </a:fontRef>
+        </p:style>
+        <p:txBody>
+          <a:bodyPr rtlCol="0" anchor="ctr"/>
+          <a:lstStyle/>
+          <a:p>
+            <a:pPr algn="ctr"/>
+            <a:endParaRPr lang="en-US"/>
+          </a:p>
+        </p:txBody>
+      </p:sp>
+      <p:sp>
+        <p:nvSpPr>
+          <p:cNvPr id="12" name="Down Arrow 11"/>
+          <p:cNvSpPr/>
+          <p:nvPr/>
+        </p:nvSpPr>
+        <p:spPr>
+          <a:xfrm>
+            <a:off x="4486124" y="2928196"/>
+            <a:ext cx="316871" cy="271604"/>
+          </a:xfrm>
+          <a:prstGeom prst="downArrow">
+            <a:avLst/>
+          </a:prstGeom>
+        </p:spPr>
+        <p:style>
+          <a:lnRef idx="1">
+            <a:schemeClr val="accent4"/>
+          </a:lnRef>
+          <a:fillRef idx="3">
+            <a:schemeClr val="accent4"/>
+          </a:fillRef>
+          <a:effectRef idx="2">
+            <a:schemeClr val="accent4"/>
+          </a:effectRef>
+          <a:fontRef idx="minor">
+            <a:schemeClr val="lt1"/>
+          </a:fontRef>
+        </p:style>
+        <p:txBody>
+          <a:bodyPr rtlCol="0" anchor="ctr"/>
+          <a:lstStyle/>
+          <a:p>
+            <a:pPr algn="ctr"/>
+            <a:endParaRPr lang="en-US"/>
+          </a:p>
+        </p:txBody>
+      </p:sp>
+      <p:sp>
+        <p:nvSpPr>
+          <p:cNvPr id="13" name="Down Arrow 12"/>
+          <p:cNvSpPr/>
+          <p:nvPr/>
+        </p:nvSpPr>
+        <p:spPr>
+          <a:xfrm>
+            <a:off x="7220138" y="2958974"/>
+            <a:ext cx="316871" cy="271604"/>
+          </a:xfrm>
+          <a:prstGeom prst="downArrow">
+            <a:avLst/>
+          </a:prstGeom>
+        </p:spPr>
+        <p:style>
+          <a:lnRef idx="1">
+            <a:schemeClr val="accent4"/>
+          </a:lnRef>
+          <a:fillRef idx="3">
+            <a:schemeClr val="accent4"/>
+          </a:fillRef>
+          <a:effectRef idx="2">
+            <a:schemeClr val="accent4"/>
+          </a:effectRef>
+          <a:fontRef idx="minor">
+            <a:schemeClr val="lt1"/>
+          </a:fontRef>
+        </p:style>
+        <p:txBody>
+          <a:bodyPr rtlCol="0" anchor="ctr"/>
+          <a:lstStyle/>
+          <a:p>
+            <a:pPr algn="ctr"/>
+            <a:endParaRPr lang="en-US"/>
+          </a:p>
+        </p:txBody>
+      </p:sp>
+    </p:spTree>
+    <p:extLst>
+      <p:ext uri="{BB962C8B-B14F-4D97-AF65-F5344CB8AC3E}">
+        <p14:creationId xmlns:p14="http://schemas.microsoft.com/office/powerpoint/2010/main" val="439203011"/>
+      </p:ext>
+    </p:extLst>
+  </p:cSld>
+  <p:clrMapOvr>
+    <a:masterClrMapping/>
+  </p:clrMapOvr>
+</p:sld>
+</file>
+
+<file path=ppt/slides/slide4.xml><?xml version="1.0" encoding="utf-8"?>
+<p:sld xmlns:a="http://schemas.openxmlformats.org/drawingml/2006/main" xmlns:r="http://schemas.openxmlformats.org/officeDocument/2006/relationships" xmlns:p="http://schemas.openxmlformats.org/presentationml/2006/main">
+  <p:cSld>
+    <p:spTree>
+      <p:nvGrpSpPr>
+        <p:cNvPr id="1" name=""/>
+        <p:cNvGrpSpPr/>
+        <p:nvPr/>
+      </p:nvGrpSpPr>
+      <p:grpSpPr>
+        <a:xfrm>
+          <a:off x="0" y="0"/>
+          <a:ext cx="0" cy="0"/>
+          <a:chOff x="0" y="0"/>
+          <a:chExt cx="0" cy="0"/>
+        </a:xfrm>
+      </p:grpSpPr>
+      <p:sp>
+        <p:nvSpPr>
+          <p:cNvPr id="2" name="Text Placeholder 1"/>
+          <p:cNvSpPr>
+            <a:spLocks noGrp="1"/>
+          </p:cNvSpPr>
+          <p:nvPr>
+            <p:ph type="body" sz="quarter" idx="10"/>
+          </p:nvPr>
+        </p:nvSpPr>
+        <p:spPr/>
+        <p:txBody>
+          <a:bodyPr/>
+          <a:lstStyle/>
+          <a:p>
+            <a:r>
+              <a:rPr lang="en-US" dirty="0" smtClean="0">
+                <a:solidFill>
+                  <a:schemeClr val="accent3"/>
+                </a:solidFill>
+                <a:latin typeface="Trebuchet MS" panose="020B0603020202020204" pitchFamily="34" charset="0"/>
+              </a:rPr>
               <a:t>Minor Files</a:t>
             </a:r>
             <a:endParaRPr lang="en-US" dirty="0">
@@ -7414,7 +7511,7 @@
 </p:sld>
 </file>
 
-<file path=ppt/slides/slide4.xml><?xml version="1.0" encoding="utf-8"?>
+<file path=ppt/slides/slide5.xml><?xml version="1.0" encoding="utf-8"?>
 <p:sld xmlns:a="http://schemas.openxmlformats.org/drawingml/2006/main" xmlns:r="http://schemas.openxmlformats.org/officeDocument/2006/relationships" xmlns:p="http://schemas.openxmlformats.org/presentationml/2006/main">
   <p:cSld>
     <p:spTree>

</xml_diff>